<commit_message>
Added Back end stuff
</commit_message>
<xml_diff>
--- a/TEAM PROJECT DELIVERABLES/TEAM5OARS.pptx
+++ b/TEAM PROJECT DELIVERABLES/TEAM5OARS.pptx
@@ -5,20 +5,31 @@
     <p:sldMasterId id="2147483732" r:id="rId1"/>
   </p:sldMasterIdLst>
   <p:handoutMasterIdLst>
-    <p:handoutMasterId r:id="rId13"/>
+    <p:handoutMasterId r:id="rId24"/>
   </p:handoutMasterIdLst>
   <p:sldIdLst>
     <p:sldId id="256" r:id="rId2"/>
     <p:sldId id="257" r:id="rId3"/>
     <p:sldId id="259" r:id="rId4"/>
-    <p:sldId id="260" r:id="rId5"/>
-    <p:sldId id="261" r:id="rId6"/>
-    <p:sldId id="258" r:id="rId7"/>
-    <p:sldId id="262" r:id="rId8"/>
-    <p:sldId id="263" r:id="rId9"/>
-    <p:sldId id="264" r:id="rId10"/>
-    <p:sldId id="268" r:id="rId11"/>
-    <p:sldId id="267" r:id="rId12"/>
+    <p:sldId id="270" r:id="rId5"/>
+    <p:sldId id="260" r:id="rId6"/>
+    <p:sldId id="269" r:id="rId7"/>
+    <p:sldId id="261" r:id="rId8"/>
+    <p:sldId id="272" r:id="rId9"/>
+    <p:sldId id="274" r:id="rId10"/>
+    <p:sldId id="273" r:id="rId11"/>
+    <p:sldId id="276" r:id="rId12"/>
+    <p:sldId id="275" r:id="rId13"/>
+    <p:sldId id="277" r:id="rId14"/>
+    <p:sldId id="279" r:id="rId15"/>
+    <p:sldId id="278" r:id="rId16"/>
+    <p:sldId id="271" r:id="rId17"/>
+    <p:sldId id="258" r:id="rId18"/>
+    <p:sldId id="262" r:id="rId19"/>
+    <p:sldId id="263" r:id="rId20"/>
+    <p:sldId id="264" r:id="rId21"/>
+    <p:sldId id="268" r:id="rId22"/>
+    <p:sldId id="267" r:id="rId23"/>
   </p:sldIdLst>
   <p:sldSz cx="9144000" cy="6858000" type="screen4x3"/>
   <p:notesSz cx="7023100" cy="9309100"/>
@@ -218,7 +229,7 @@
           <a:p>
             <a:fld id="{21A295EC-C5AF-478A-B6B7-ACF964938DD4}" type="datetimeFigureOut">
               <a:rPr lang="en-US" smtClean="0"/>
-              <a:t>3/19/2016</a:t>
+              <a:t>3/21/2016</a:t>
             </a:fld>
             <a:endParaRPr lang="en-US"/>
           </a:p>
@@ -582,7 +593,7 @@
             <a:fld id="{C7F82005-8F97-448F-A12C-2EE43D7D0751}" type="datetimeFigureOut">
               <a:rPr lang="en-US" smtClean="0"/>
               <a:pPr/>
-              <a:t>3/19/2016</a:t>
+              <a:t>3/21/2016</a:t>
             </a:fld>
             <a:endParaRPr lang="en-US"/>
           </a:p>
@@ -977,7 +988,7 @@
             <a:fld id="{C7F82005-8F97-448F-A12C-2EE43D7D0751}" type="datetimeFigureOut">
               <a:rPr lang="en-US" smtClean="0"/>
               <a:pPr/>
-              <a:t>3/19/2016</a:t>
+              <a:t>3/21/2016</a:t>
             </a:fld>
             <a:endParaRPr lang="en-US"/>
           </a:p>
@@ -1512,7 +1523,7 @@
             <a:fld id="{C7F82005-8F97-448F-A12C-2EE43D7D0751}" type="datetimeFigureOut">
               <a:rPr lang="en-US" smtClean="0"/>
               <a:pPr/>
-              <a:t>3/19/2016</a:t>
+              <a:t>3/21/2016</a:t>
             </a:fld>
             <a:endParaRPr lang="en-US"/>
           </a:p>
@@ -1646,7 +1657,7 @@
             <a:fld id="{C7F82005-8F97-448F-A12C-2EE43D7D0751}" type="datetimeFigureOut">
               <a:rPr lang="en-US" smtClean="0"/>
               <a:pPr/>
-              <a:t>3/19/2016</a:t>
+              <a:t>3/21/2016</a:t>
             </a:fld>
             <a:endParaRPr lang="en-US"/>
           </a:p>
@@ -2191,7 +2202,7 @@
             <a:fld id="{C7F82005-8F97-448F-A12C-2EE43D7D0751}" type="datetimeFigureOut">
               <a:rPr lang="en-US" smtClean="0"/>
               <a:pPr/>
-              <a:t>3/19/2016</a:t>
+              <a:t>3/21/2016</a:t>
             </a:fld>
             <a:endParaRPr lang="en-US"/>
           </a:p>
@@ -2488,7 +2499,7 @@
             <a:fld id="{C7F82005-8F97-448F-A12C-2EE43D7D0751}" type="datetimeFigureOut">
               <a:rPr lang="en-US" smtClean="0"/>
               <a:pPr/>
-              <a:t>3/19/2016</a:t>
+              <a:t>3/21/2016</a:t>
             </a:fld>
             <a:endParaRPr lang="en-US"/>
           </a:p>
@@ -3149,7 +3160,7 @@
             <a:fld id="{C7F82005-8F97-448F-A12C-2EE43D7D0751}" type="datetimeFigureOut">
               <a:rPr lang="en-US" smtClean="0"/>
               <a:pPr/>
-              <a:t>3/19/2016</a:t>
+              <a:t>3/21/2016</a:t>
             </a:fld>
             <a:endParaRPr lang="en-US"/>
           </a:p>
@@ -3587,7 +3598,7 @@
             <a:fld id="{C7F82005-8F97-448F-A12C-2EE43D7D0751}" type="datetimeFigureOut">
               <a:rPr lang="en-US" smtClean="0"/>
               <a:pPr/>
-              <a:t>3/19/2016</a:t>
+              <a:t>3/21/2016</a:t>
             </a:fld>
             <a:endParaRPr lang="en-US"/>
           </a:p>
@@ -3902,7 +3913,7 @@
             <a:fld id="{C7F82005-8F97-448F-A12C-2EE43D7D0751}" type="datetimeFigureOut">
               <a:rPr lang="en-US" smtClean="0"/>
               <a:pPr/>
-              <a:t>3/19/2016</a:t>
+              <a:t>3/21/2016</a:t>
             </a:fld>
             <a:endParaRPr lang="en-US"/>
           </a:p>
@@ -4637,7 +4648,7 @@
             <a:fld id="{C7F82005-8F97-448F-A12C-2EE43D7D0751}" type="datetimeFigureOut">
               <a:rPr lang="en-US" smtClean="0"/>
               <a:pPr/>
-              <a:t>3/19/2016</a:t>
+              <a:t>3/21/2016</a:t>
             </a:fld>
             <a:endParaRPr lang="en-US"/>
           </a:p>
@@ -5303,7 +5314,7 @@
             <a:fld id="{C7F82005-8F97-448F-A12C-2EE43D7D0751}" type="datetimeFigureOut">
               <a:rPr lang="en-US" smtClean="0"/>
               <a:pPr/>
-              <a:t>3/19/2016</a:t>
+              <a:t>3/21/2016</a:t>
             </a:fld>
             <a:endParaRPr lang="en-US"/>
           </a:p>
@@ -5577,7 +5588,7 @@
             <a:fld id="{C7F82005-8F97-448F-A12C-2EE43D7D0751}" type="datetimeFigureOut">
               <a:rPr lang="en-US" smtClean="0"/>
               <a:pPr/>
-              <a:t>3/19/2016</a:t>
+              <a:t>3/21/2016</a:t>
             </a:fld>
             <a:endParaRPr lang="en-US"/>
           </a:p>
@@ -6491,24 +6502,205 @@
       </p:grpSpPr>
       <p:sp>
         <p:nvSpPr>
-          <p:cNvPr id="5" name="Rectangle 4"/>
-          <p:cNvSpPr/>
+          <p:cNvPr id="2" name="Title 1"/>
+          <p:cNvSpPr>
+            <a:spLocks noGrp="1"/>
+          </p:cNvSpPr>
+          <p:nvPr>
+            <p:ph type="title"/>
+          </p:nvPr>
+        </p:nvSpPr>
+        <p:spPr>
+          <a:xfrm>
+            <a:off x="609600" y="-152400"/>
+            <a:ext cx="8534400" cy="2054352"/>
+          </a:xfrm>
+        </p:spPr>
+        <p:txBody>
+          <a:bodyPr>
+            <a:normAutofit/>
+          </a:bodyPr>
+          <a:lstStyle/>
+          <a:p>
+            <a:r>
+              <a:rPr lang="en-US" sz="2400" b="1" dirty="0" smtClean="0"/>
+              <a:t>TEAM</a:t>
+            </a:r>
+            <a:r>
+              <a:rPr lang="en-US" sz="2400" b="1" dirty="0">
+                <a:solidFill>
+                  <a:srgbClr val="FF0000"/>
+                </a:solidFill>
+              </a:rPr>
+              <a:t>5</a:t>
+            </a:r>
+            <a:r>
+              <a:rPr lang="en-US" sz="2400" b="1" dirty="0" smtClean="0"/>
+              <a:t>O</a:t>
+            </a:r>
+            <a:r>
+              <a:rPr lang="en-US" sz="2400" b="1" dirty="0" smtClean="0">
+                <a:solidFill>
+                  <a:srgbClr val="FF0000"/>
+                </a:solidFill>
+              </a:rPr>
+              <a:t>AR</a:t>
+            </a:r>
+            <a:r>
+              <a:rPr lang="en-US" sz="2400" b="1" dirty="0" smtClean="0"/>
+              <a:t>S</a:t>
+            </a:r>
+            <a:r>
+              <a:rPr lang="en-US" sz="2400" dirty="0"/>
+              <a:t/>
+            </a:r>
+            <a:br>
+              <a:rPr lang="en-US" sz="2400" dirty="0"/>
+            </a:br>
+            <a:r>
+              <a:rPr lang="en-US" sz="2400" b="1" dirty="0"/>
+              <a:t>O</a:t>
+            </a:r>
+            <a:r>
+              <a:rPr lang="en-US" sz="2400" dirty="0"/>
+              <a:t>nline </a:t>
+            </a:r>
+            <a:r>
+              <a:rPr lang="en-US" sz="2400" b="1" dirty="0">
+                <a:solidFill>
+                  <a:srgbClr val="FF0000"/>
+                </a:solidFill>
+              </a:rPr>
+              <a:t>A</a:t>
+            </a:r>
+            <a:r>
+              <a:rPr lang="en-US" sz="2400" dirty="0"/>
+              <a:t>partment </a:t>
+            </a:r>
+            <a:r>
+              <a:rPr lang="en-US" sz="2400" b="1" dirty="0">
+                <a:solidFill>
+                  <a:srgbClr val="FF0000"/>
+                </a:solidFill>
+              </a:rPr>
+              <a:t>R</a:t>
+            </a:r>
+            <a:r>
+              <a:rPr lang="en-US" sz="2400" dirty="0"/>
+              <a:t>ental </a:t>
+            </a:r>
+            <a:r>
+              <a:rPr lang="en-US" sz="2400" b="1" dirty="0" smtClean="0"/>
+              <a:t>S</a:t>
+            </a:r>
+            <a:r>
+              <a:rPr lang="en-US" sz="2400" dirty="0" smtClean="0"/>
+              <a:t>ystem</a:t>
+            </a:r>
+            <a:r>
+              <a:rPr lang="en-US" sz="2400" dirty="0"/>
+              <a:t/>
+            </a:r>
+            <a:br>
+              <a:rPr lang="en-US" sz="2400" dirty="0"/>
+            </a:br>
+            <a:r>
+              <a:rPr lang="en-US" sz="2400" dirty="0"/>
+              <a:t/>
+            </a:r>
+            <a:br>
+              <a:rPr lang="en-US" sz="2400" dirty="0"/>
+            </a:br>
+            <a:r>
+              <a:rPr lang="en-US" dirty="0" smtClean="0"/>
+              <a:t>Data Design – Relational Model</a:t>
+            </a:r>
+            <a:endParaRPr lang="en-US" dirty="0"/>
+          </a:p>
+        </p:txBody>
+      </p:sp>
+      <p:sp>
+        <p:nvSpPr>
+          <p:cNvPr id="3" name="Content Placeholder 2"/>
+          <p:cNvSpPr>
+            <a:spLocks noGrp="1"/>
+          </p:cNvSpPr>
+          <p:nvPr>
+            <p:ph sz="quarter" idx="1"/>
+          </p:nvPr>
+        </p:nvSpPr>
+        <p:spPr>
+          <a:xfrm>
+            <a:off x="320040" y="2261419"/>
+            <a:ext cx="8503920" cy="4572000"/>
+          </a:xfrm>
+        </p:spPr>
+        <p:txBody>
+          <a:bodyPr/>
+          <a:lstStyle/>
+          <a:p>
+            <a:pPr marL="0" indent="0">
+              <a:buNone/>
+            </a:pPr>
+            <a:endParaRPr lang="en-US" dirty="0" smtClean="0"/>
+          </a:p>
+          <a:p>
+            <a:pPr marL="0" indent="0">
+              <a:buNone/>
+            </a:pPr>
+            <a:r>
+              <a:rPr lang="en-US" dirty="0"/>
+              <a:t> </a:t>
+            </a:r>
+            <a:r>
+              <a:rPr lang="en-US" dirty="0" smtClean="0"/>
+              <a:t>   </a:t>
+            </a:r>
+          </a:p>
+        </p:txBody>
+      </p:sp>
+      <p:pic>
+        <p:nvPicPr>
+          <p:cNvPr id="6" name="Picture 5"/>
+          <p:cNvPicPr>
+            <a:picLocks noChangeAspect="1"/>
+          </p:cNvPicPr>
           <p:nvPr/>
-        </p:nvSpPr>
-        <p:spPr>
-          <a:xfrm>
-            <a:off x="4011" y="987552"/>
-            <a:ext cx="9139989" cy="5794248"/>
+        </p:nvPicPr>
+        <p:blipFill>
+          <a:blip r:embed="rId2"/>
+          <a:stretch>
+            <a:fillRect/>
+          </a:stretch>
+        </p:blipFill>
+        <p:spPr>
+          <a:xfrm>
+            <a:off x="107361" y="2514600"/>
+            <a:ext cx="4472600" cy="3581400"/>
           </a:xfrm>
           <a:prstGeom prst="rect">
             <a:avLst/>
           </a:prstGeom>
-          <a:solidFill>
-            <a:schemeClr val="bg1"/>
-          </a:solidFill>
+        </p:spPr>
+      </p:pic>
+      <p:sp>
+        <p:nvSpPr>
+          <p:cNvPr id="5" name="Oval 4"/>
+          <p:cNvSpPr/>
+          <p:nvPr/>
+        </p:nvSpPr>
+        <p:spPr>
+          <a:xfrm rot="20863118">
+            <a:off x="1277309" y="4225948"/>
+            <a:ext cx="1570167" cy="509379"/>
+          </a:xfrm>
+          <a:prstGeom prst="ellipse">
+            <a:avLst/>
+          </a:prstGeom>
+          <a:noFill/>
           <a:ln>
             <a:solidFill>
-              <a:schemeClr val="bg1"/>
+              <a:srgbClr val="00B0F0"/>
             </a:solidFill>
           </a:ln>
         </p:spPr>
@@ -6537,81 +6729,10 @@
           </a:p>
         </p:txBody>
       </p:sp>
-      <p:sp>
-        <p:nvSpPr>
-          <p:cNvPr id="2" name="Title 1"/>
-          <p:cNvSpPr>
-            <a:spLocks noGrp="1"/>
-          </p:cNvSpPr>
-          <p:nvPr>
-            <p:ph type="title"/>
-          </p:nvPr>
-        </p:nvSpPr>
-        <p:spPr/>
-        <p:txBody>
-          <a:bodyPr>
-            <a:normAutofit/>
-          </a:bodyPr>
-          <a:lstStyle/>
-          <a:p>
-            <a:r>
-              <a:rPr lang="en-US" dirty="0"/>
-              <a:t>MS Project </a:t>
-            </a:r>
-            <a:r>
-              <a:rPr lang="en-US" dirty="0" smtClean="0"/>
-              <a:t>Plan</a:t>
-            </a:r>
-            <a:endParaRPr lang="en-US" dirty="0"/>
-          </a:p>
-        </p:txBody>
-      </p:sp>
-      <p:sp>
-        <p:nvSpPr>
-          <p:cNvPr id="3" name="Content Placeholder 2"/>
-          <p:cNvSpPr>
-            <a:spLocks noGrp="1"/>
-          </p:cNvSpPr>
-          <p:nvPr>
-            <p:ph sz="quarter" idx="1"/>
-          </p:nvPr>
-        </p:nvSpPr>
-        <p:spPr/>
-        <p:txBody>
-          <a:bodyPr/>
-          <a:lstStyle/>
-          <a:p>
-            <a:endParaRPr lang="en-US"/>
-          </a:p>
-        </p:txBody>
-      </p:sp>
-      <p:pic>
-        <p:nvPicPr>
-          <p:cNvPr id="4" name="Picture 3"/>
-          <p:cNvPicPr>
-            <a:picLocks noChangeAspect="1"/>
-          </p:cNvPicPr>
-          <p:nvPr/>
-        </p:nvPicPr>
-        <p:blipFill rotWithShape="1">
-          <a:blip r:embed="rId2"/>
-          <a:srcRect l="44444" r="6667" b="15804"/>
-          <a:stretch/>
-        </p:blipFill>
-        <p:spPr>
-          <a:xfrm>
-            <a:off x="4010" y="987551"/>
-            <a:ext cx="9063789" cy="5550137"/>
-          </a:xfrm>
-          <a:prstGeom prst="rect">
-            <a:avLst/>
-          </a:prstGeom>
-        </p:spPr>
-      </p:pic>
     </p:spTree>
     <p:extLst>
       <p:ext uri="{BB962C8B-B14F-4D97-AF65-F5344CB8AC3E}">
-        <p14:creationId xmlns:p14="http://schemas.microsoft.com/office/powerpoint/2010/main" val="3267790372"/>
+        <p14:creationId xmlns:p14="http://schemas.microsoft.com/office/powerpoint/2010/main" val="3056314514"/>
       </p:ext>
     </p:extLst>
   </p:cSld>
@@ -6657,7 +6778,7 @@
         </p:nvSpPr>
         <p:spPr>
           <a:xfrm>
-            <a:off x="304800" y="0"/>
+            <a:off x="609600" y="-152400"/>
             <a:ext cx="8534400" cy="2054352"/>
           </a:xfrm>
         </p:spPr>
@@ -6668,11 +6789,11 @@
           <a:lstStyle/>
           <a:p>
             <a:r>
-              <a:rPr lang="en-US" sz="2800" b="1" dirty="0" smtClean="0"/>
+              <a:rPr lang="en-US" sz="2400" b="1" dirty="0" smtClean="0"/>
               <a:t>TEAM</a:t>
             </a:r>
             <a:r>
-              <a:rPr lang="en-US" sz="2800" b="1" dirty="0">
+              <a:rPr lang="en-US" sz="2400" b="1" dirty="0">
                 <a:solidFill>
                   <a:srgbClr val="FF0000"/>
                 </a:solidFill>
@@ -6680,11 +6801,11 @@
               <a:t>5</a:t>
             </a:r>
             <a:r>
-              <a:rPr lang="en-US" sz="2800" b="1" dirty="0" smtClean="0"/>
+              <a:rPr lang="en-US" sz="2400" b="1" dirty="0" smtClean="0"/>
               <a:t>O</a:t>
             </a:r>
             <a:r>
-              <a:rPr lang="en-US" sz="2800" b="1" dirty="0" smtClean="0">
+              <a:rPr lang="en-US" sz="2400" b="1" dirty="0" smtClean="0">
                 <a:solidFill>
                   <a:srgbClr val="FF0000"/>
                 </a:solidFill>
@@ -6692,26 +6813,26 @@
               <a:t>AR</a:t>
             </a:r>
             <a:r>
-              <a:rPr lang="en-US" sz="2800" b="1" dirty="0" smtClean="0"/>
+              <a:rPr lang="en-US" sz="2400" b="1" dirty="0" smtClean="0"/>
               <a:t>S</a:t>
             </a:r>
             <a:r>
-              <a:rPr lang="en-US" sz="2800" dirty="0"/>
+              <a:rPr lang="en-US" sz="2400" dirty="0"/>
               <a:t/>
             </a:r>
             <a:br>
-              <a:rPr lang="en-US" sz="2800" dirty="0"/>
+              <a:rPr lang="en-US" sz="2400" dirty="0"/>
             </a:br>
             <a:r>
-              <a:rPr lang="en-US" sz="2800" b="1" dirty="0"/>
+              <a:rPr lang="en-US" sz="2400" b="1" dirty="0"/>
               <a:t>O</a:t>
             </a:r>
             <a:r>
-              <a:rPr lang="en-US" sz="2800" dirty="0"/>
+              <a:rPr lang="en-US" sz="2400" dirty="0"/>
               <a:t>nline </a:t>
             </a:r>
             <a:r>
-              <a:rPr lang="en-US" sz="2800" b="1" dirty="0">
+              <a:rPr lang="en-US" sz="2400" b="1" dirty="0">
                 <a:solidFill>
                   <a:srgbClr val="FF0000"/>
                 </a:solidFill>
@@ -6719,11 +6840,11 @@
               <a:t>A</a:t>
             </a:r>
             <a:r>
-              <a:rPr lang="en-US" sz="2800" dirty="0"/>
+              <a:rPr lang="en-US" sz="2400" dirty="0"/>
               <a:t>partment </a:t>
             </a:r>
             <a:r>
-              <a:rPr lang="en-US" sz="2800" b="1" dirty="0">
+              <a:rPr lang="en-US" sz="2400" b="1" dirty="0">
                 <a:solidFill>
                   <a:srgbClr val="FF0000"/>
                 </a:solidFill>
@@ -6731,46 +6852,34 @@
               <a:t>R</a:t>
             </a:r>
             <a:r>
-              <a:rPr lang="en-US" sz="2800" dirty="0"/>
+              <a:rPr lang="en-US" sz="2400" dirty="0"/>
               <a:t>ental </a:t>
             </a:r>
             <a:r>
-              <a:rPr lang="en-US" sz="2800" b="1" dirty="0"/>
+              <a:rPr lang="en-US" sz="2400" b="1" dirty="0" smtClean="0"/>
               <a:t>S</a:t>
             </a:r>
             <a:r>
-              <a:rPr lang="en-US" sz="2800" dirty="0"/>
+              <a:rPr lang="en-US" sz="2400" dirty="0" smtClean="0"/>
               <a:t>ystem</a:t>
             </a:r>
             <a:r>
-              <a:rPr lang="en-US" sz="3600" dirty="0">
-                <a:solidFill>
-                  <a:srgbClr val="8CADAE">
-                    <a:shade val="75000"/>
-                  </a:srgbClr>
-                </a:solidFill>
-              </a:rPr>
+              <a:rPr lang="en-US" sz="2400" dirty="0"/>
               <a:t/>
             </a:r>
             <a:br>
-              <a:rPr lang="en-US" sz="3600" dirty="0">
-                <a:solidFill>
-                  <a:srgbClr val="8CADAE">
-                    <a:shade val="75000"/>
-                  </a:srgbClr>
-                </a:solidFill>
-              </a:rPr>
+              <a:rPr lang="en-US" sz="2400" dirty="0"/>
             </a:br>
             <a:r>
-              <a:rPr lang="en-US" sz="3600" dirty="0" smtClean="0"/>
+              <a:rPr lang="en-US" sz="2400" dirty="0"/>
               <a:t/>
             </a:r>
             <a:br>
-              <a:rPr lang="en-US" sz="3600" dirty="0" smtClean="0"/>
+              <a:rPr lang="en-US" sz="2400" dirty="0"/>
             </a:br>
             <a:r>
               <a:rPr lang="en-US" dirty="0" smtClean="0"/>
-              <a:t>Chat Demo</a:t>
+              <a:t>Data Design – Relational Model</a:t>
             </a:r>
             <a:endParaRPr lang="en-US" dirty="0"/>
           </a:p>
@@ -6788,55 +6897,108 @@
         </p:nvSpPr>
         <p:spPr>
           <a:xfrm>
-            <a:off x="30480" y="1981200"/>
-            <a:ext cx="9220200" cy="4572000"/>
+            <a:off x="320040" y="2261419"/>
+            <a:ext cx="8503920" cy="4572000"/>
           </a:xfrm>
         </p:spPr>
         <p:txBody>
           <a:bodyPr/>
           <a:lstStyle/>
           <a:p>
-            <a:r>
-              <a:rPr lang="en-US" dirty="0" smtClean="0">
-                <a:latin typeface="Arial" panose="020B0604020202020204" pitchFamily="34" charset="0"/>
-                <a:cs typeface="Arial" panose="020B0604020202020204" pitchFamily="34" charset="0"/>
-              </a:rPr>
-              <a:t>Go to purechat.com &gt; Sign up &gt; Copy snippet code &gt; paste before end of &lt;/body&gt;</a:t>
-            </a:r>
-            <a:r>
-              <a:rPr lang="en-US" sz="4400" dirty="0">
-                <a:solidFill>
-                  <a:srgbClr val="8CADAE">
-                    <a:shade val="75000"/>
-                  </a:srgbClr>
-                </a:solidFill>
-              </a:rPr>
-              <a:t/>
-            </a:r>
-            <a:br>
-              <a:rPr lang="en-US" sz="4400" dirty="0">
-                <a:solidFill>
-                  <a:srgbClr val="8CADAE">
-                    <a:shade val="75000"/>
-                  </a:srgbClr>
-                </a:solidFill>
-              </a:rPr>
-            </a:br>
-            <a:endParaRPr lang="en-US" dirty="0"/>
-          </a:p>
-          <a:p>
+            <a:pPr marL="0" indent="0">
+              <a:buNone/>
+            </a:pPr>
+            <a:endParaRPr lang="en-US" dirty="0" smtClean="0"/>
+          </a:p>
+          <a:p>
+            <a:pPr marL="0" indent="0">
+              <a:buNone/>
+            </a:pPr>
+            <a:r>
+              <a:rPr lang="en-US" dirty="0"/>
+              <a:t> </a:t>
+            </a:r>
             <a:r>
               <a:rPr lang="en-US" dirty="0" smtClean="0"/>
-              <a:t>Live Chat demo.</a:t>
-            </a:r>
-            <a:endParaRPr lang="en-US" dirty="0"/>
+              <a:t>   </a:t>
+            </a:r>
+          </a:p>
+        </p:txBody>
+      </p:sp>
+      <p:pic>
+        <p:nvPicPr>
+          <p:cNvPr id="7" name="Picture 6"/>
+          <p:cNvPicPr>
+            <a:picLocks noChangeAspect="1"/>
+          </p:cNvPicPr>
+          <p:nvPr/>
+        </p:nvPicPr>
+        <p:blipFill>
+          <a:blip r:embed="rId2"/>
+          <a:stretch>
+            <a:fillRect/>
+          </a:stretch>
+        </p:blipFill>
+        <p:spPr>
+          <a:xfrm>
+            <a:off x="320040" y="1901951"/>
+            <a:ext cx="2880360" cy="4063117"/>
+          </a:xfrm>
+          <a:prstGeom prst="rect">
+            <a:avLst/>
+          </a:prstGeom>
+        </p:spPr>
+      </p:pic>
+      <p:sp>
+        <p:nvSpPr>
+          <p:cNvPr id="5" name="Oval 4"/>
+          <p:cNvSpPr/>
+          <p:nvPr/>
+        </p:nvSpPr>
+        <p:spPr>
+          <a:xfrm rot="15613867">
+            <a:off x="966826" y="3556603"/>
+            <a:ext cx="1441740" cy="778782"/>
+          </a:xfrm>
+          <a:prstGeom prst="ellipse">
+            <a:avLst/>
+          </a:prstGeom>
+          <a:noFill/>
+          <a:ln>
+            <a:solidFill>
+              <a:srgbClr val="00B0F0"/>
+            </a:solidFill>
+          </a:ln>
+        </p:spPr>
+        <p:style>
+          <a:lnRef idx="2">
+            <a:schemeClr val="accent1">
+              <a:shade val="50000"/>
+            </a:schemeClr>
+          </a:lnRef>
+          <a:fillRef idx="1">
+            <a:schemeClr val="accent1"/>
+          </a:fillRef>
+          <a:effectRef idx="0">
+            <a:schemeClr val="accent1"/>
+          </a:effectRef>
+          <a:fontRef idx="minor">
+            <a:schemeClr val="lt1"/>
+          </a:fontRef>
+        </p:style>
+        <p:txBody>
+          <a:bodyPr rtlCol="0" anchor="ctr"/>
+          <a:lstStyle/>
+          <a:p>
+            <a:pPr algn="ctr"/>
+            <a:endParaRPr lang="en-US"/>
           </a:p>
         </p:txBody>
       </p:sp>
     </p:spTree>
     <p:extLst>
       <p:ext uri="{BB962C8B-B14F-4D97-AF65-F5344CB8AC3E}">
-        <p14:creationId xmlns:p14="http://schemas.microsoft.com/office/powerpoint/2010/main" val="2971098582"/>
+        <p14:creationId xmlns:p14="http://schemas.microsoft.com/office/powerpoint/2010/main" val="3949821554"/>
       </p:ext>
     </p:extLst>
   </p:cSld>
@@ -6853,7 +7015,7 @@
 </p:sld>
 </file>
 
-<file path=ppt/slides/slide2.xml><?xml version="1.0" encoding="utf-8"?>
+<file path=ppt/slides/slide12.xml><?xml version="1.0" encoding="utf-8"?>
 <p:sld xmlns:a="http://schemas.openxmlformats.org/drawingml/2006/main" xmlns:r="http://schemas.openxmlformats.org/officeDocument/2006/relationships" xmlns:p="http://schemas.openxmlformats.org/presentationml/2006/main">
   <p:cSld>
     <p:spTree>
@@ -6882,7 +7044,7 @@
         </p:nvSpPr>
         <p:spPr>
           <a:xfrm>
-            <a:off x="304800" y="0"/>
+            <a:off x="609600" y="-152400"/>
             <a:ext cx="8534400" cy="2054352"/>
           </a:xfrm>
         </p:spPr>
@@ -6893,11 +7055,11 @@
           <a:lstStyle/>
           <a:p>
             <a:r>
-              <a:rPr lang="en-US" sz="2800" b="1" dirty="0" smtClean="0"/>
+              <a:rPr lang="en-US" sz="2400" b="1" dirty="0" smtClean="0"/>
               <a:t>TEAM</a:t>
             </a:r>
             <a:r>
-              <a:rPr lang="en-US" sz="2800" b="1" dirty="0">
+              <a:rPr lang="en-US" sz="2400" b="1" dirty="0">
                 <a:solidFill>
                   <a:srgbClr val="FF0000"/>
                 </a:solidFill>
@@ -6905,11 +7067,11 @@
               <a:t>5</a:t>
             </a:r>
             <a:r>
-              <a:rPr lang="en-US" sz="2800" b="1" dirty="0" smtClean="0"/>
+              <a:rPr lang="en-US" sz="2400" b="1" dirty="0" smtClean="0"/>
               <a:t>O</a:t>
             </a:r>
             <a:r>
-              <a:rPr lang="en-US" sz="2800" b="1" dirty="0" smtClean="0">
+              <a:rPr lang="en-US" sz="2400" b="1" dirty="0" smtClean="0">
                 <a:solidFill>
                   <a:srgbClr val="FF0000"/>
                 </a:solidFill>
@@ -6917,26 +7079,26 @@
               <a:t>AR</a:t>
             </a:r>
             <a:r>
-              <a:rPr lang="en-US" sz="2800" b="1" dirty="0" smtClean="0"/>
+              <a:rPr lang="en-US" sz="2400" b="1" dirty="0" smtClean="0"/>
               <a:t>S</a:t>
             </a:r>
             <a:r>
-              <a:rPr lang="en-US" sz="2800" dirty="0"/>
+              <a:rPr lang="en-US" sz="2400" dirty="0"/>
               <a:t/>
             </a:r>
             <a:br>
-              <a:rPr lang="en-US" sz="2800" dirty="0"/>
+              <a:rPr lang="en-US" sz="2400" dirty="0"/>
             </a:br>
             <a:r>
-              <a:rPr lang="en-US" sz="2800" b="1" dirty="0"/>
+              <a:rPr lang="en-US" sz="2400" b="1" dirty="0"/>
               <a:t>O</a:t>
             </a:r>
             <a:r>
-              <a:rPr lang="en-US" sz="2800" dirty="0"/>
+              <a:rPr lang="en-US" sz="2400" dirty="0"/>
               <a:t>nline </a:t>
             </a:r>
             <a:r>
-              <a:rPr lang="en-US" sz="2800" b="1" dirty="0">
+              <a:rPr lang="en-US" sz="2400" b="1" dirty="0">
                 <a:solidFill>
                   <a:srgbClr val="FF0000"/>
                 </a:solidFill>
@@ -6944,11 +7106,11 @@
               <a:t>A</a:t>
             </a:r>
             <a:r>
-              <a:rPr lang="en-US" sz="2800" dirty="0"/>
+              <a:rPr lang="en-US" sz="2400" dirty="0"/>
               <a:t>partment </a:t>
             </a:r>
             <a:r>
-              <a:rPr lang="en-US" sz="2800" b="1" dirty="0">
+              <a:rPr lang="en-US" sz="2400" b="1" dirty="0">
                 <a:solidFill>
                   <a:srgbClr val="FF0000"/>
                 </a:solidFill>
@@ -6956,44 +7118,36 @@
               <a:t>R</a:t>
             </a:r>
             <a:r>
-              <a:rPr lang="en-US" sz="2800" dirty="0"/>
+              <a:rPr lang="en-US" sz="2400" dirty="0"/>
               <a:t>ental </a:t>
             </a:r>
             <a:r>
-              <a:rPr lang="en-US" sz="2800" b="1" dirty="0" smtClean="0"/>
+              <a:rPr lang="en-US" sz="2400" b="1" dirty="0" smtClean="0"/>
               <a:t>S</a:t>
             </a:r>
             <a:r>
-              <a:rPr lang="en-US" sz="2800" dirty="0" smtClean="0"/>
+              <a:rPr lang="en-US" sz="2400" dirty="0" smtClean="0"/>
               <a:t>ystem</a:t>
             </a:r>
             <a:r>
-              <a:rPr lang="en-US" sz="2000" dirty="0"/>
+              <a:rPr lang="en-US" sz="2400" dirty="0"/>
               <a:t/>
             </a:r>
             <a:br>
-              <a:rPr lang="en-US" sz="2000" dirty="0"/>
+              <a:rPr lang="en-US" sz="2400" dirty="0"/>
             </a:br>
             <a:r>
-              <a:rPr lang="en-US" sz="3600" dirty="0"/>
+              <a:rPr lang="en-US" sz="2400" dirty="0"/>
               <a:t/>
             </a:r>
             <a:br>
-              <a:rPr lang="en-US" sz="3600" dirty="0"/>
+              <a:rPr lang="en-US" sz="2400" dirty="0"/>
             </a:br>
             <a:r>
-              <a:rPr lang="en-US" dirty="0" smtClean="0">
-                <a:solidFill>
-                  <a:srgbClr val="FF0000"/>
-                </a:solidFill>
-              </a:rPr>
-              <a:t>DATABASE BACK END</a:t>
-            </a:r>
-            <a:endParaRPr lang="en-US" dirty="0">
-              <a:solidFill>
-                <a:srgbClr val="FF0000"/>
-              </a:solidFill>
-            </a:endParaRPr>
+              <a:rPr lang="en-US" dirty="0" smtClean="0"/>
+              <a:t>Data Design – Relational Model</a:t>
+            </a:r>
+            <a:endParaRPr lang="en-US" dirty="0"/>
           </a:p>
         </p:txBody>
       </p:sp>
@@ -7017,41 +7171,117 @@
           <a:bodyPr/>
           <a:lstStyle/>
           <a:p>
+            <a:pPr marL="0" indent="0">
+              <a:buNone/>
+            </a:pPr>
+            <a:endParaRPr lang="en-US" dirty="0" smtClean="0"/>
+          </a:p>
+          <a:p>
+            <a:pPr marL="0" indent="0">
+              <a:buNone/>
+            </a:pPr>
             <a:r>
               <a:rPr lang="en-US" dirty="0"/>
-              <a:t>Added by VH; Please discuss DB </a:t>
+              <a:t> </a:t>
             </a:r>
             <a:r>
               <a:rPr lang="en-US" dirty="0" smtClean="0"/>
-              <a:t>first</a:t>
-            </a:r>
-          </a:p>
-          <a:p>
-            <a:endParaRPr lang="en-US" dirty="0"/>
-          </a:p>
-          <a:p>
-            <a:r>
-              <a:rPr lang="en-US" dirty="0" smtClean="0"/>
-              <a:t>Please place these as dividers </a:t>
-            </a:r>
-            <a:endParaRPr lang="en-US" dirty="0"/>
+              <a:t>   </a:t>
+            </a:r>
+          </a:p>
+        </p:txBody>
+      </p:sp>
+      <p:pic>
+        <p:nvPicPr>
+          <p:cNvPr id="6" name="Picture 5"/>
+          <p:cNvPicPr>
+            <a:picLocks noChangeAspect="1"/>
+          </p:cNvPicPr>
+          <p:nvPr/>
+        </p:nvPicPr>
+        <p:blipFill>
+          <a:blip r:embed="rId2"/>
+          <a:stretch>
+            <a:fillRect/>
+          </a:stretch>
+        </p:blipFill>
+        <p:spPr>
+          <a:xfrm>
+            <a:off x="152400" y="2261419"/>
+            <a:ext cx="4039129" cy="2920181"/>
+          </a:xfrm>
+          <a:prstGeom prst="rect">
+            <a:avLst/>
+          </a:prstGeom>
+        </p:spPr>
+      </p:pic>
+      <p:sp>
+        <p:nvSpPr>
+          <p:cNvPr id="7" name="Oval 6"/>
+          <p:cNvSpPr/>
+          <p:nvPr/>
+        </p:nvSpPr>
+        <p:spPr>
+          <a:xfrm rot="2093738">
+            <a:off x="1284250" y="3290999"/>
+            <a:ext cx="1768412" cy="516825"/>
+          </a:xfrm>
+          <a:prstGeom prst="ellipse">
+            <a:avLst/>
+          </a:prstGeom>
+          <a:noFill/>
+          <a:ln>
+            <a:solidFill>
+              <a:srgbClr val="00B0F0"/>
+            </a:solidFill>
+          </a:ln>
+        </p:spPr>
+        <p:style>
+          <a:lnRef idx="2">
+            <a:schemeClr val="accent1">
+              <a:shade val="50000"/>
+            </a:schemeClr>
+          </a:lnRef>
+          <a:fillRef idx="1">
+            <a:schemeClr val="accent1"/>
+          </a:fillRef>
+          <a:effectRef idx="0">
+            <a:schemeClr val="accent1"/>
+          </a:effectRef>
+          <a:fontRef idx="minor">
+            <a:schemeClr val="lt1"/>
+          </a:fontRef>
+        </p:style>
+        <p:txBody>
+          <a:bodyPr rtlCol="0" anchor="ctr"/>
+          <a:lstStyle/>
+          <a:p>
+            <a:pPr algn="ctr"/>
+            <a:endParaRPr lang="en-US"/>
           </a:p>
         </p:txBody>
       </p:sp>
     </p:spTree>
     <p:extLst>
       <p:ext uri="{BB962C8B-B14F-4D97-AF65-F5344CB8AC3E}">
-        <p14:creationId xmlns:p14="http://schemas.microsoft.com/office/powerpoint/2010/main" val="4266379870"/>
+        <p14:creationId xmlns:p14="http://schemas.microsoft.com/office/powerpoint/2010/main" val="1195315492"/>
       </p:ext>
     </p:extLst>
   </p:cSld>
   <p:clrMapOvr>
     <a:masterClrMapping/>
   </p:clrMapOvr>
+  <p:timing>
+    <p:tnLst>
+      <p:par>
+        <p:cTn id="1" dur="indefinite" restart="never" nodeType="tmRoot"/>
+      </p:par>
+    </p:tnLst>
+  </p:timing>
 </p:sld>
 </file>
 
-<file path=ppt/slides/slide3.xml><?xml version="1.0" encoding="utf-8"?>
+<file path=ppt/slides/slide13.xml><?xml version="1.0" encoding="utf-8"?>
 <p:sld xmlns:a="http://schemas.openxmlformats.org/drawingml/2006/main" xmlns:r="http://schemas.openxmlformats.org/officeDocument/2006/relationships" xmlns:p="http://schemas.openxmlformats.org/presentationml/2006/main">
   <p:cSld>
     <p:spTree>
@@ -7080,7 +7310,7 @@
         </p:nvSpPr>
         <p:spPr>
           <a:xfrm>
-            <a:off x="381000" y="-10886"/>
+            <a:off x="609600" y="-152400"/>
             <a:ext cx="8534400" cy="2054352"/>
           </a:xfrm>
         </p:spPr>
@@ -7181,7 +7411,7 @@
             </a:br>
             <a:r>
               <a:rPr lang="en-US" dirty="0" smtClean="0"/>
-              <a:t>Data Analysis – ERD Model</a:t>
+              <a:t>Data Design – Relational Model</a:t>
             </a:r>
             <a:endParaRPr lang="en-US" dirty="0"/>
           </a:p>
@@ -7207,53 +7437,117 @@
           <a:bodyPr/>
           <a:lstStyle/>
           <a:p>
+            <a:pPr marL="0" indent="0">
+              <a:buNone/>
+            </a:pPr>
+            <a:endParaRPr lang="en-US" dirty="0" smtClean="0"/>
+          </a:p>
+          <a:p>
+            <a:pPr marL="0" indent="0">
+              <a:buNone/>
+            </a:pPr>
+            <a:r>
+              <a:rPr lang="en-US" dirty="0"/>
+              <a:t> </a:t>
+            </a:r>
             <a:r>
               <a:rPr lang="en-US" dirty="0" smtClean="0"/>
-              <a:t>Summary of #</a:t>
-            </a:r>
-            <a:r>
-              <a:rPr lang="en-US" dirty="0" err="1" smtClean="0"/>
-              <a:t>Es</a:t>
-            </a:r>
-            <a:r>
-              <a:rPr lang="en-US" dirty="0" smtClean="0"/>
-              <a:t>, #</a:t>
-            </a:r>
-            <a:r>
-              <a:rPr lang="en-US" dirty="0" err="1" smtClean="0"/>
-              <a:t>Rs</a:t>
-            </a:r>
-            <a:r>
-              <a:rPr lang="en-US" dirty="0" smtClean="0"/>
-              <a:t>, and #As.</a:t>
-            </a:r>
-          </a:p>
-          <a:p>
-            <a:endParaRPr lang="en-US" dirty="0"/>
-          </a:p>
-          <a:p>
-            <a:r>
-              <a:rPr lang="en-US" dirty="0" smtClean="0"/>
-              <a:t>ERD Model</a:t>
-            </a:r>
-            <a:endParaRPr lang="en-US" dirty="0"/>
+              <a:t>   </a:t>
+            </a:r>
+          </a:p>
+        </p:txBody>
+      </p:sp>
+      <p:pic>
+        <p:nvPicPr>
+          <p:cNvPr id="6" name="Picture 5"/>
+          <p:cNvPicPr>
+            <a:picLocks noChangeAspect="1"/>
+          </p:cNvPicPr>
+          <p:nvPr/>
+        </p:nvPicPr>
+        <p:blipFill>
+          <a:blip r:embed="rId2"/>
+          <a:stretch>
+            <a:fillRect/>
+          </a:stretch>
+        </p:blipFill>
+        <p:spPr>
+          <a:xfrm>
+            <a:off x="152400" y="2561195"/>
+            <a:ext cx="4191000" cy="3200661"/>
+          </a:xfrm>
+          <a:prstGeom prst="rect">
+            <a:avLst/>
+          </a:prstGeom>
+        </p:spPr>
+      </p:pic>
+      <p:sp>
+        <p:nvSpPr>
+          <p:cNvPr id="5" name="Oval 4"/>
+          <p:cNvSpPr/>
+          <p:nvPr/>
+        </p:nvSpPr>
+        <p:spPr>
+          <a:xfrm rot="16841186">
+            <a:off x="1641053" y="3490813"/>
+            <a:ext cx="1981200" cy="837793"/>
+          </a:xfrm>
+          <a:prstGeom prst="ellipse">
+            <a:avLst/>
+          </a:prstGeom>
+          <a:noFill/>
+          <a:ln>
+            <a:solidFill>
+              <a:srgbClr val="00B0F0"/>
+            </a:solidFill>
+          </a:ln>
+        </p:spPr>
+        <p:style>
+          <a:lnRef idx="2">
+            <a:schemeClr val="accent1">
+              <a:shade val="50000"/>
+            </a:schemeClr>
+          </a:lnRef>
+          <a:fillRef idx="1">
+            <a:schemeClr val="accent1"/>
+          </a:fillRef>
+          <a:effectRef idx="0">
+            <a:schemeClr val="accent1"/>
+          </a:effectRef>
+          <a:fontRef idx="minor">
+            <a:schemeClr val="lt1"/>
+          </a:fontRef>
+        </p:style>
+        <p:txBody>
+          <a:bodyPr rtlCol="0" anchor="ctr"/>
+          <a:lstStyle/>
+          <a:p>
+            <a:pPr algn="ctr"/>
+            <a:endParaRPr lang="en-US"/>
           </a:p>
         </p:txBody>
       </p:sp>
     </p:spTree>
     <p:extLst>
       <p:ext uri="{BB962C8B-B14F-4D97-AF65-F5344CB8AC3E}">
-        <p14:creationId xmlns:p14="http://schemas.microsoft.com/office/powerpoint/2010/main" val="2922699264"/>
+        <p14:creationId xmlns:p14="http://schemas.microsoft.com/office/powerpoint/2010/main" val="3516559076"/>
       </p:ext>
     </p:extLst>
   </p:cSld>
   <p:clrMapOvr>
     <a:masterClrMapping/>
   </p:clrMapOvr>
+  <p:timing>
+    <p:tnLst>
+      <p:par>
+        <p:cTn id="1" dur="indefinite" restart="never" nodeType="tmRoot"/>
+      </p:par>
+    </p:tnLst>
+  </p:timing>
 </p:sld>
 </file>
 
-<file path=ppt/slides/slide4.xml><?xml version="1.0" encoding="utf-8"?>
+<file path=ppt/slides/slide14.xml><?xml version="1.0" encoding="utf-8"?>
 <p:sld xmlns:a="http://schemas.openxmlformats.org/drawingml/2006/main" xmlns:r="http://schemas.openxmlformats.org/officeDocument/2006/relationships" xmlns:p="http://schemas.openxmlformats.org/presentationml/2006/main">
   <p:cSld>
     <p:spTree>
@@ -7282,7 +7576,7 @@
         </p:nvSpPr>
         <p:spPr>
           <a:xfrm>
-            <a:off x="304800" y="0"/>
+            <a:off x="609600" y="-152400"/>
             <a:ext cx="8534400" cy="2054352"/>
           </a:xfrm>
         </p:spPr>
@@ -7360,26 +7654,30 @@
               <a:t>ental </a:t>
             </a:r>
             <a:r>
-              <a:rPr lang="en-US" sz="2400" b="1" dirty="0"/>
+              <a:rPr lang="en-US" sz="2400" b="1" dirty="0" smtClean="0"/>
               <a:t>S</a:t>
             </a:r>
             <a:r>
-              <a:rPr lang="en-US" sz="2400" dirty="0"/>
+              <a:rPr lang="en-US" sz="2400" dirty="0" smtClean="0"/>
               <a:t>ystem</a:t>
             </a:r>
+            <a:r>
+              <a:rPr lang="en-US" sz="2400" dirty="0"/>
+              <a:t/>
+            </a:r>
             <a:br>
               <a:rPr lang="en-US" sz="2400" dirty="0"/>
             </a:br>
             <a:r>
-              <a:rPr lang="en-US" sz="3600" dirty="0"/>
+              <a:rPr lang="en-US" sz="2400" dirty="0"/>
               <a:t/>
             </a:r>
             <a:br>
-              <a:rPr lang="en-US" sz="3600" dirty="0"/>
+              <a:rPr lang="en-US" sz="2400" dirty="0"/>
             </a:br>
             <a:r>
               <a:rPr lang="en-US" dirty="0" smtClean="0"/>
-              <a:t>Contract – Data Requirements Specification</a:t>
+              <a:t>Data Design – Relational Model</a:t>
             </a:r>
             <a:endParaRPr lang="en-US" dirty="0"/>
           </a:p>
@@ -7405,59 +7703,383 @@
           <a:bodyPr/>
           <a:lstStyle/>
           <a:p>
+            <a:pPr marL="0" indent="0">
+              <a:buNone/>
+            </a:pPr>
+            <a:endParaRPr lang="en-US" dirty="0" smtClean="0"/>
+          </a:p>
+          <a:p>
+            <a:pPr marL="0" indent="0">
+              <a:buNone/>
+            </a:pPr>
+            <a:r>
+              <a:rPr lang="en-US" dirty="0"/>
+              <a:t> </a:t>
+            </a:r>
             <a:r>
               <a:rPr lang="en-US" dirty="0" smtClean="0"/>
-              <a:t>Summary of #</a:t>
-            </a:r>
-            <a:r>
-              <a:rPr lang="en-US" dirty="0" err="1" smtClean="0"/>
-              <a:t>Es</a:t>
-            </a:r>
-            <a:r>
-              <a:rPr lang="en-US" dirty="0" smtClean="0"/>
-              <a:t>, #</a:t>
-            </a:r>
-            <a:r>
-              <a:rPr lang="en-US" dirty="0" err="1" smtClean="0"/>
-              <a:t>Rs</a:t>
-            </a:r>
-            <a:r>
-              <a:rPr lang="en-US" dirty="0" smtClean="0"/>
-              <a:t>, and #As.</a:t>
-            </a:r>
-          </a:p>
-          <a:p>
-            <a:endParaRPr lang="en-US" dirty="0"/>
-          </a:p>
-          <a:p>
-            <a:r>
-              <a:rPr lang="en-US" dirty="0" smtClean="0"/>
-              <a:t>Table 1. Data Requirements</a:t>
-            </a:r>
-          </a:p>
-          <a:p>
-            <a:r>
-              <a:rPr lang="en-US" dirty="0" smtClean="0"/>
-              <a:t>Table 2. Constraints</a:t>
-            </a:r>
-            <a:endParaRPr lang="en-US" dirty="0"/>
+              <a:t>   </a:t>
+            </a:r>
+          </a:p>
+        </p:txBody>
+      </p:sp>
+      <p:pic>
+        <p:nvPicPr>
+          <p:cNvPr id="6" name="Picture 5"/>
+          <p:cNvPicPr>
+            <a:picLocks noChangeAspect="1"/>
+          </p:cNvPicPr>
+          <p:nvPr/>
+        </p:nvPicPr>
+        <p:blipFill>
+          <a:blip r:embed="rId2"/>
+          <a:stretch>
+            <a:fillRect/>
+          </a:stretch>
+        </p:blipFill>
+        <p:spPr>
+          <a:xfrm>
+            <a:off x="228600" y="2156644"/>
+            <a:ext cx="3657600" cy="3957145"/>
+          </a:xfrm>
+          <a:prstGeom prst="rect">
+            <a:avLst/>
+          </a:prstGeom>
+        </p:spPr>
+      </p:pic>
+      <p:sp>
+        <p:nvSpPr>
+          <p:cNvPr id="5" name="Oval 4"/>
+          <p:cNvSpPr/>
+          <p:nvPr/>
+        </p:nvSpPr>
+        <p:spPr>
+          <a:xfrm rot="15088727">
+            <a:off x="1001443" y="2877786"/>
+            <a:ext cx="2297651" cy="923976"/>
+          </a:xfrm>
+          <a:prstGeom prst="ellipse">
+            <a:avLst/>
+          </a:prstGeom>
+          <a:noFill/>
+          <a:ln>
+            <a:solidFill>
+              <a:srgbClr val="00B0F0"/>
+            </a:solidFill>
+          </a:ln>
+        </p:spPr>
+        <p:style>
+          <a:lnRef idx="2">
+            <a:schemeClr val="accent1">
+              <a:shade val="50000"/>
+            </a:schemeClr>
+          </a:lnRef>
+          <a:fillRef idx="1">
+            <a:schemeClr val="accent1"/>
+          </a:fillRef>
+          <a:effectRef idx="0">
+            <a:schemeClr val="accent1"/>
+          </a:effectRef>
+          <a:fontRef idx="minor">
+            <a:schemeClr val="lt1"/>
+          </a:fontRef>
+        </p:style>
+        <p:txBody>
+          <a:bodyPr rtlCol="0" anchor="ctr"/>
+          <a:lstStyle/>
+          <a:p>
+            <a:pPr algn="ctr"/>
+            <a:endParaRPr lang="en-US"/>
           </a:p>
         </p:txBody>
       </p:sp>
     </p:spTree>
     <p:extLst>
       <p:ext uri="{BB962C8B-B14F-4D97-AF65-F5344CB8AC3E}">
-        <p14:creationId xmlns:p14="http://schemas.microsoft.com/office/powerpoint/2010/main" val="1709730969"/>
+        <p14:creationId xmlns:p14="http://schemas.microsoft.com/office/powerpoint/2010/main" val="176884131"/>
       </p:ext>
     </p:extLst>
   </p:cSld>
   <p:clrMapOvr>
     <a:masterClrMapping/>
   </p:clrMapOvr>
+  <p:timing>
+    <p:tnLst>
+      <p:par>
+        <p:cTn id="1" dur="indefinite" restart="never" nodeType="tmRoot"/>
+      </p:par>
+    </p:tnLst>
+  </p:timing>
 </p:sld>
 </file>
 
-<file path=ppt/slides/slide5.xml><?xml version="1.0" encoding="utf-8"?>
+<file path=ppt/slides/slide15.xml><?xml version="1.0" encoding="utf-8"?>
+<p:sld xmlns:a="http://schemas.openxmlformats.org/drawingml/2006/main" xmlns:r="http://schemas.openxmlformats.org/officeDocument/2006/relationships" xmlns:p="http://schemas.openxmlformats.org/presentationml/2006/main">
+  <p:cSld>
+    <p:spTree>
+      <p:nvGrpSpPr>
+        <p:cNvPr id="1" name=""/>
+        <p:cNvGrpSpPr/>
+        <p:nvPr/>
+      </p:nvGrpSpPr>
+      <p:grpSpPr>
+        <a:xfrm>
+          <a:off x="0" y="0"/>
+          <a:ext cx="0" cy="0"/>
+          <a:chOff x="0" y="0"/>
+          <a:chExt cx="0" cy="0"/>
+        </a:xfrm>
+      </p:grpSpPr>
+      <p:sp>
+        <p:nvSpPr>
+          <p:cNvPr id="2" name="Title 1"/>
+          <p:cNvSpPr>
+            <a:spLocks noGrp="1"/>
+          </p:cNvSpPr>
+          <p:nvPr>
+            <p:ph type="title"/>
+          </p:nvPr>
+        </p:nvSpPr>
+        <p:spPr>
+          <a:xfrm>
+            <a:off x="609600" y="-152400"/>
+            <a:ext cx="8534400" cy="2054352"/>
+          </a:xfrm>
+        </p:spPr>
+        <p:txBody>
+          <a:bodyPr>
+            <a:normAutofit/>
+          </a:bodyPr>
+          <a:lstStyle/>
+          <a:p>
+            <a:r>
+              <a:rPr lang="en-US" sz="2400" b="1" dirty="0" smtClean="0"/>
+              <a:t>TEAM</a:t>
+            </a:r>
+            <a:r>
+              <a:rPr lang="en-US" sz="2400" b="1" dirty="0">
+                <a:solidFill>
+                  <a:srgbClr val="FF0000"/>
+                </a:solidFill>
+              </a:rPr>
+              <a:t>5</a:t>
+            </a:r>
+            <a:r>
+              <a:rPr lang="en-US" sz="2400" b="1" dirty="0" smtClean="0"/>
+              <a:t>O</a:t>
+            </a:r>
+            <a:r>
+              <a:rPr lang="en-US" sz="2400" b="1" dirty="0" smtClean="0">
+                <a:solidFill>
+                  <a:srgbClr val="FF0000"/>
+                </a:solidFill>
+              </a:rPr>
+              <a:t>AR</a:t>
+            </a:r>
+            <a:r>
+              <a:rPr lang="en-US" sz="2400" b="1" dirty="0" smtClean="0"/>
+              <a:t>S</a:t>
+            </a:r>
+            <a:r>
+              <a:rPr lang="en-US" sz="2400" dirty="0"/>
+              <a:t/>
+            </a:r>
+            <a:br>
+              <a:rPr lang="en-US" sz="2400" dirty="0"/>
+            </a:br>
+            <a:r>
+              <a:rPr lang="en-US" sz="2400" b="1" dirty="0"/>
+              <a:t>O</a:t>
+            </a:r>
+            <a:r>
+              <a:rPr lang="en-US" sz="2400" dirty="0"/>
+              <a:t>nline </a:t>
+            </a:r>
+            <a:r>
+              <a:rPr lang="en-US" sz="2400" b="1" dirty="0">
+                <a:solidFill>
+                  <a:srgbClr val="FF0000"/>
+                </a:solidFill>
+              </a:rPr>
+              <a:t>A</a:t>
+            </a:r>
+            <a:r>
+              <a:rPr lang="en-US" sz="2400" dirty="0"/>
+              <a:t>partment </a:t>
+            </a:r>
+            <a:r>
+              <a:rPr lang="en-US" sz="2400" b="1" dirty="0">
+                <a:solidFill>
+                  <a:srgbClr val="FF0000"/>
+                </a:solidFill>
+              </a:rPr>
+              <a:t>R</a:t>
+            </a:r>
+            <a:r>
+              <a:rPr lang="en-US" sz="2400" dirty="0"/>
+              <a:t>ental </a:t>
+            </a:r>
+            <a:r>
+              <a:rPr lang="en-US" sz="2400" b="1" dirty="0" smtClean="0"/>
+              <a:t>S</a:t>
+            </a:r>
+            <a:r>
+              <a:rPr lang="en-US" sz="2400" dirty="0" smtClean="0"/>
+              <a:t>ystem</a:t>
+            </a:r>
+            <a:r>
+              <a:rPr lang="en-US" sz="2400" dirty="0"/>
+              <a:t/>
+            </a:r>
+            <a:br>
+              <a:rPr lang="en-US" sz="2400" dirty="0"/>
+            </a:br>
+            <a:r>
+              <a:rPr lang="en-US" sz="2400" dirty="0"/>
+              <a:t/>
+            </a:r>
+            <a:br>
+              <a:rPr lang="en-US" sz="2400" dirty="0"/>
+            </a:br>
+            <a:r>
+              <a:rPr lang="en-US" dirty="0" smtClean="0"/>
+              <a:t>Data Design – Relational Model</a:t>
+            </a:r>
+            <a:endParaRPr lang="en-US" dirty="0"/>
+          </a:p>
+        </p:txBody>
+      </p:sp>
+      <p:sp>
+        <p:nvSpPr>
+          <p:cNvPr id="3" name="Content Placeholder 2"/>
+          <p:cNvSpPr>
+            <a:spLocks noGrp="1"/>
+          </p:cNvSpPr>
+          <p:nvPr>
+            <p:ph sz="quarter" idx="1"/>
+          </p:nvPr>
+        </p:nvSpPr>
+        <p:spPr>
+          <a:xfrm>
+            <a:off x="320040" y="2261419"/>
+            <a:ext cx="8503920" cy="4572000"/>
+          </a:xfrm>
+        </p:spPr>
+        <p:txBody>
+          <a:bodyPr/>
+          <a:lstStyle/>
+          <a:p>
+            <a:pPr marL="0" indent="0">
+              <a:buNone/>
+            </a:pPr>
+            <a:endParaRPr lang="en-US" dirty="0" smtClean="0"/>
+          </a:p>
+          <a:p>
+            <a:pPr marL="0" indent="0">
+              <a:buNone/>
+            </a:pPr>
+            <a:r>
+              <a:rPr lang="en-US" dirty="0"/>
+              <a:t> </a:t>
+            </a:r>
+            <a:r>
+              <a:rPr lang="en-US" dirty="0" smtClean="0"/>
+              <a:t>   </a:t>
+            </a:r>
+          </a:p>
+        </p:txBody>
+      </p:sp>
+      <p:pic>
+        <p:nvPicPr>
+          <p:cNvPr id="6" name="Picture 5"/>
+          <p:cNvPicPr>
+            <a:picLocks noChangeAspect="1"/>
+          </p:cNvPicPr>
+          <p:nvPr/>
+        </p:nvPicPr>
+        <p:blipFill>
+          <a:blip r:embed="rId2"/>
+          <a:stretch>
+            <a:fillRect/>
+          </a:stretch>
+        </p:blipFill>
+        <p:spPr>
+          <a:xfrm>
+            <a:off x="320040" y="1752600"/>
+            <a:ext cx="2423160" cy="4794022"/>
+          </a:xfrm>
+          <a:prstGeom prst="rect">
+            <a:avLst/>
+          </a:prstGeom>
+        </p:spPr>
+      </p:pic>
+      <p:sp>
+        <p:nvSpPr>
+          <p:cNvPr id="5" name="Oval 4"/>
+          <p:cNvSpPr/>
+          <p:nvPr/>
+        </p:nvSpPr>
+        <p:spPr>
+          <a:xfrm rot="19868541">
+            <a:off x="145513" y="2598436"/>
+            <a:ext cx="1981200" cy="538287"/>
+          </a:xfrm>
+          <a:prstGeom prst="ellipse">
+            <a:avLst/>
+          </a:prstGeom>
+          <a:noFill/>
+          <a:ln>
+            <a:solidFill>
+              <a:srgbClr val="00B0F0"/>
+            </a:solidFill>
+          </a:ln>
+        </p:spPr>
+        <p:style>
+          <a:lnRef idx="2">
+            <a:schemeClr val="accent1">
+              <a:shade val="50000"/>
+            </a:schemeClr>
+          </a:lnRef>
+          <a:fillRef idx="1">
+            <a:schemeClr val="accent1"/>
+          </a:fillRef>
+          <a:effectRef idx="0">
+            <a:schemeClr val="accent1"/>
+          </a:effectRef>
+          <a:fontRef idx="minor">
+            <a:schemeClr val="lt1"/>
+          </a:fontRef>
+        </p:style>
+        <p:txBody>
+          <a:bodyPr rtlCol="0" anchor="ctr"/>
+          <a:lstStyle/>
+          <a:p>
+            <a:pPr algn="ctr"/>
+            <a:endParaRPr lang="en-US"/>
+          </a:p>
+        </p:txBody>
+      </p:sp>
+    </p:spTree>
+    <p:extLst>
+      <p:ext uri="{BB962C8B-B14F-4D97-AF65-F5344CB8AC3E}">
+        <p14:creationId xmlns:p14="http://schemas.microsoft.com/office/powerpoint/2010/main" val="119406860"/>
+      </p:ext>
+    </p:extLst>
+  </p:cSld>
+  <p:clrMapOvr>
+    <a:masterClrMapping/>
+  </p:clrMapOvr>
+  <p:timing>
+    <p:tnLst>
+      <p:par>
+        <p:cTn id="1" dur="indefinite" restart="never" nodeType="tmRoot"/>
+      </p:par>
+    </p:tnLst>
+  </p:timing>
+</p:sld>
+</file>
+
+<file path=ppt/slides/slide16.xml><?xml version="1.0" encoding="utf-8"?>
 <p:sld xmlns:a="http://schemas.openxmlformats.org/drawingml/2006/main" xmlns:r="http://schemas.openxmlformats.org/officeDocument/2006/relationships" xmlns:p="http://schemas.openxmlformats.org/presentationml/2006/main">
   <p:cSld>
     <p:spTree>
@@ -7715,8 +8337,8 @@
         </p:blipFill>
         <p:spPr bwMode="auto">
           <a:xfrm>
-            <a:off x="2321168" y="4824075"/>
-            <a:ext cx="2936631" cy="1425179"/>
+            <a:off x="4495800" y="4419600"/>
+            <a:ext cx="4420392" cy="2145265"/>
           </a:xfrm>
           <a:prstGeom prst="rect">
             <a:avLst/>
@@ -7759,13 +8381,2004 @@
     </p:spTree>
     <p:extLst>
       <p:ext uri="{BB962C8B-B14F-4D97-AF65-F5344CB8AC3E}">
-        <p14:creationId xmlns:p14="http://schemas.microsoft.com/office/powerpoint/2010/main" val="2876414311"/>
+        <p14:creationId xmlns:p14="http://schemas.microsoft.com/office/powerpoint/2010/main" val="3210348186"/>
       </p:ext>
     </p:extLst>
   </p:cSld>
   <p:clrMapOvr>
     <a:masterClrMapping/>
   </p:clrMapOvr>
+  <p:timing>
+    <p:tnLst>
+      <p:par>
+        <p:cTn id="1" dur="indefinite" restart="never" nodeType="tmRoot"/>
+      </p:par>
+    </p:tnLst>
+  </p:timing>
+</p:sld>
+</file>
+
+<file path=ppt/slides/slide17.xml><?xml version="1.0" encoding="utf-8"?>
+<p:sld xmlns:a="http://schemas.openxmlformats.org/drawingml/2006/main" xmlns:r="http://schemas.openxmlformats.org/officeDocument/2006/relationships" xmlns:p="http://schemas.openxmlformats.org/presentationml/2006/main">
+  <p:cSld>
+    <p:spTree>
+      <p:nvGrpSpPr>
+        <p:cNvPr id="1" name=""/>
+        <p:cNvGrpSpPr/>
+        <p:nvPr/>
+      </p:nvGrpSpPr>
+      <p:grpSpPr>
+        <a:xfrm>
+          <a:off x="0" y="0"/>
+          <a:ext cx="0" cy="0"/>
+          <a:chOff x="0" y="0"/>
+          <a:chExt cx="0" cy="0"/>
+        </a:xfrm>
+      </p:grpSpPr>
+      <p:sp>
+        <p:nvSpPr>
+          <p:cNvPr id="2" name="Title 1"/>
+          <p:cNvSpPr>
+            <a:spLocks noGrp="1"/>
+          </p:cNvSpPr>
+          <p:nvPr>
+            <p:ph type="title"/>
+          </p:nvPr>
+        </p:nvSpPr>
+        <p:spPr>
+          <a:xfrm>
+            <a:off x="304800" y="0"/>
+            <a:ext cx="8534400" cy="2054352"/>
+          </a:xfrm>
+        </p:spPr>
+        <p:txBody>
+          <a:bodyPr>
+            <a:normAutofit/>
+          </a:bodyPr>
+          <a:lstStyle/>
+          <a:p>
+            <a:r>
+              <a:rPr lang="en-US" sz="2400" b="1" dirty="0" smtClean="0"/>
+              <a:t>TEAMO</a:t>
+            </a:r>
+            <a:r>
+              <a:rPr lang="en-US" sz="2400" b="1" dirty="0" smtClean="0">
+                <a:solidFill>
+                  <a:srgbClr val="FF0000"/>
+                </a:solidFill>
+              </a:rPr>
+              <a:t>AR</a:t>
+            </a:r>
+            <a:r>
+              <a:rPr lang="en-US" sz="2400" b="1" dirty="0" smtClean="0"/>
+              <a:t>S</a:t>
+            </a:r>
+            <a:r>
+              <a:rPr lang="en-US" sz="2400" dirty="0"/>
+              <a:t/>
+            </a:r>
+            <a:br>
+              <a:rPr lang="en-US" sz="2400" dirty="0"/>
+            </a:br>
+            <a:r>
+              <a:rPr lang="en-US" sz="2400" b="1" dirty="0"/>
+              <a:t>O</a:t>
+            </a:r>
+            <a:r>
+              <a:rPr lang="en-US" sz="2400" dirty="0"/>
+              <a:t>nline </a:t>
+            </a:r>
+            <a:r>
+              <a:rPr lang="en-US" sz="2400" b="1" dirty="0">
+                <a:solidFill>
+                  <a:srgbClr val="FF0000"/>
+                </a:solidFill>
+              </a:rPr>
+              <a:t>A</a:t>
+            </a:r>
+            <a:r>
+              <a:rPr lang="en-US" sz="2400" dirty="0"/>
+              <a:t>partment </a:t>
+            </a:r>
+            <a:r>
+              <a:rPr lang="en-US" sz="2400" b="1" dirty="0">
+                <a:solidFill>
+                  <a:srgbClr val="FF0000"/>
+                </a:solidFill>
+              </a:rPr>
+              <a:t>R</a:t>
+            </a:r>
+            <a:r>
+              <a:rPr lang="en-US" sz="2400" dirty="0"/>
+              <a:t>ental </a:t>
+            </a:r>
+            <a:r>
+              <a:rPr lang="en-US" sz="2400" b="1" dirty="0" smtClean="0"/>
+              <a:t>S</a:t>
+            </a:r>
+            <a:r>
+              <a:rPr lang="en-US" sz="2400" dirty="0" smtClean="0"/>
+              <a:t>ystem</a:t>
+            </a:r>
+            <a:r>
+              <a:rPr lang="en-US" sz="3600" dirty="0">
+                <a:solidFill>
+                  <a:srgbClr val="8CADAE">
+                    <a:shade val="75000"/>
+                  </a:srgbClr>
+                </a:solidFill>
+              </a:rPr>
+              <a:t/>
+            </a:r>
+            <a:br>
+              <a:rPr lang="en-US" sz="3600" dirty="0">
+                <a:solidFill>
+                  <a:srgbClr val="8CADAE">
+                    <a:shade val="75000"/>
+                  </a:srgbClr>
+                </a:solidFill>
+              </a:rPr>
+            </a:br>
+            <a:r>
+              <a:rPr lang="en-US" sz="3600" dirty="0" smtClean="0"/>
+              <a:t/>
+            </a:r>
+            <a:br>
+              <a:rPr lang="en-US" sz="3600" dirty="0" smtClean="0"/>
+            </a:br>
+            <a:r>
+              <a:rPr lang="en-US" dirty="0" smtClean="0">
+                <a:solidFill>
+                  <a:srgbClr val="FF0000"/>
+                </a:solidFill>
+              </a:rPr>
+              <a:t>FRONT END</a:t>
+            </a:r>
+            <a:endParaRPr lang="en-US" dirty="0">
+              <a:solidFill>
+                <a:srgbClr val="FF0000"/>
+              </a:solidFill>
+            </a:endParaRPr>
+          </a:p>
+        </p:txBody>
+      </p:sp>
+      <p:sp>
+        <p:nvSpPr>
+          <p:cNvPr id="3" name="Content Placeholder 2"/>
+          <p:cNvSpPr>
+            <a:spLocks noGrp="1"/>
+          </p:cNvSpPr>
+          <p:nvPr>
+            <p:ph sz="quarter" idx="1"/>
+          </p:nvPr>
+        </p:nvSpPr>
+        <p:spPr>
+          <a:xfrm>
+            <a:off x="320040" y="1981200"/>
+            <a:ext cx="8503920" cy="4572000"/>
+          </a:xfrm>
+        </p:spPr>
+        <p:txBody>
+          <a:bodyPr/>
+          <a:lstStyle/>
+          <a:p>
+            <a:r>
+              <a:rPr lang="en-US" dirty="0" smtClean="0"/>
+              <a:t>Added by VH;</a:t>
+            </a:r>
+            <a:endParaRPr lang="en-US" dirty="0"/>
+          </a:p>
+          <a:p>
+            <a:r>
+              <a:rPr lang="en-US" dirty="0"/>
+              <a:t>Please place these as dividers </a:t>
+            </a:r>
+          </a:p>
+          <a:p>
+            <a:endParaRPr lang="en-US" dirty="0"/>
+          </a:p>
+        </p:txBody>
+      </p:sp>
+    </p:spTree>
+    <p:extLst>
+      <p:ext uri="{BB962C8B-B14F-4D97-AF65-F5344CB8AC3E}">
+        <p14:creationId xmlns:p14="http://schemas.microsoft.com/office/powerpoint/2010/main" val="3428671890"/>
+      </p:ext>
+    </p:extLst>
+  </p:cSld>
+  <p:clrMapOvr>
+    <a:masterClrMapping/>
+  </p:clrMapOvr>
+  <p:timing>
+    <p:tnLst>
+      <p:par>
+        <p:cTn id="1" dur="indefinite" restart="never" nodeType="tmRoot"/>
+      </p:par>
+    </p:tnLst>
+  </p:timing>
+</p:sld>
+</file>
+
+<file path=ppt/slides/slide18.xml><?xml version="1.0" encoding="utf-8"?>
+<p:sld xmlns:a="http://schemas.openxmlformats.org/drawingml/2006/main" xmlns:r="http://schemas.openxmlformats.org/officeDocument/2006/relationships" xmlns:p="http://schemas.openxmlformats.org/presentationml/2006/main">
+  <p:cSld>
+    <p:spTree>
+      <p:nvGrpSpPr>
+        <p:cNvPr id="1" name=""/>
+        <p:cNvGrpSpPr/>
+        <p:nvPr/>
+      </p:nvGrpSpPr>
+      <p:grpSpPr>
+        <a:xfrm>
+          <a:off x="0" y="0"/>
+          <a:ext cx="0" cy="0"/>
+          <a:chOff x="0" y="0"/>
+          <a:chExt cx="0" cy="0"/>
+        </a:xfrm>
+      </p:grpSpPr>
+      <p:sp>
+        <p:nvSpPr>
+          <p:cNvPr id="2" name="Title 1"/>
+          <p:cNvSpPr>
+            <a:spLocks noGrp="1"/>
+          </p:cNvSpPr>
+          <p:nvPr>
+            <p:ph type="title"/>
+          </p:nvPr>
+        </p:nvSpPr>
+        <p:spPr>
+          <a:xfrm>
+            <a:off x="304800" y="0"/>
+            <a:ext cx="8534400" cy="2054352"/>
+          </a:xfrm>
+        </p:spPr>
+        <p:txBody>
+          <a:bodyPr>
+            <a:normAutofit fontScale="90000"/>
+          </a:bodyPr>
+          <a:lstStyle/>
+          <a:p>
+            <a:r>
+              <a:rPr lang="en-US" sz="2400" b="1" dirty="0" smtClean="0"/>
+              <a:t>TEAM</a:t>
+            </a:r>
+            <a:r>
+              <a:rPr lang="en-US" sz="2400" b="1" dirty="0">
+                <a:solidFill>
+                  <a:srgbClr val="FF0000"/>
+                </a:solidFill>
+              </a:rPr>
+              <a:t>5</a:t>
+            </a:r>
+            <a:r>
+              <a:rPr lang="en-US" sz="2400" b="1" dirty="0" smtClean="0"/>
+              <a:t>O</a:t>
+            </a:r>
+            <a:r>
+              <a:rPr lang="en-US" sz="2400" b="1" dirty="0" smtClean="0">
+                <a:solidFill>
+                  <a:srgbClr val="FF0000"/>
+                </a:solidFill>
+              </a:rPr>
+              <a:t>AR</a:t>
+            </a:r>
+            <a:r>
+              <a:rPr lang="en-US" sz="2400" b="1" dirty="0" smtClean="0"/>
+              <a:t>S</a:t>
+            </a:r>
+            <a:r>
+              <a:rPr lang="en-US" sz="2400" dirty="0"/>
+              <a:t/>
+            </a:r>
+            <a:br>
+              <a:rPr lang="en-US" sz="2400" dirty="0"/>
+            </a:br>
+            <a:r>
+              <a:rPr lang="en-US" sz="2400" b="1" dirty="0"/>
+              <a:t>O</a:t>
+            </a:r>
+            <a:r>
+              <a:rPr lang="en-US" sz="2400" dirty="0"/>
+              <a:t>nline </a:t>
+            </a:r>
+            <a:r>
+              <a:rPr lang="en-US" sz="2400" b="1" dirty="0">
+                <a:solidFill>
+                  <a:srgbClr val="FF0000"/>
+                </a:solidFill>
+              </a:rPr>
+              <a:t>A</a:t>
+            </a:r>
+            <a:r>
+              <a:rPr lang="en-US" sz="2400" dirty="0"/>
+              <a:t>partment </a:t>
+            </a:r>
+            <a:r>
+              <a:rPr lang="en-US" sz="2400" b="1" dirty="0">
+                <a:solidFill>
+                  <a:srgbClr val="FF0000"/>
+                </a:solidFill>
+              </a:rPr>
+              <a:t>R</a:t>
+            </a:r>
+            <a:r>
+              <a:rPr lang="en-US" sz="2400" dirty="0"/>
+              <a:t>ental </a:t>
+            </a:r>
+            <a:r>
+              <a:rPr lang="en-US" sz="2400" b="1" dirty="0"/>
+              <a:t>S</a:t>
+            </a:r>
+            <a:r>
+              <a:rPr lang="en-US" sz="2400" dirty="0"/>
+              <a:t>ystem</a:t>
+            </a:r>
+            <a:br>
+              <a:rPr lang="en-US" sz="2400" dirty="0"/>
+            </a:br>
+            <a:r>
+              <a:rPr lang="en-US" sz="3600" dirty="0" smtClean="0"/>
+              <a:t/>
+            </a:r>
+            <a:br>
+              <a:rPr lang="en-US" sz="3600" dirty="0" smtClean="0"/>
+            </a:br>
+            <a:r>
+              <a:rPr lang="en-US" sz="3600" dirty="0" smtClean="0"/>
+              <a:t>Business Modeling: </a:t>
+            </a:r>
+            <a:r>
+              <a:rPr lang="en-US" dirty="0" smtClean="0"/>
+              <a:t>UML USE CASE Model</a:t>
+            </a:r>
+            <a:endParaRPr lang="en-US" dirty="0"/>
+          </a:p>
+        </p:txBody>
+      </p:sp>
+      <p:sp>
+        <p:nvSpPr>
+          <p:cNvPr id="3" name="Content Placeholder 2"/>
+          <p:cNvSpPr>
+            <a:spLocks noGrp="1"/>
+          </p:cNvSpPr>
+          <p:nvPr>
+            <p:ph sz="quarter" idx="1"/>
+          </p:nvPr>
+        </p:nvSpPr>
+        <p:spPr>
+          <a:xfrm>
+            <a:off x="320040" y="1981200"/>
+            <a:ext cx="8503920" cy="4572000"/>
+          </a:xfrm>
+        </p:spPr>
+        <p:txBody>
+          <a:bodyPr/>
+          <a:lstStyle/>
+          <a:p>
+            <a:r>
+              <a:rPr lang="en-US" dirty="0" smtClean="0"/>
+              <a:t>Actors;</a:t>
+            </a:r>
+            <a:endParaRPr lang="en-US" dirty="0"/>
+          </a:p>
+          <a:p>
+            <a:r>
+              <a:rPr lang="en-US" dirty="0" smtClean="0"/>
+              <a:t>UML USE CASE Model</a:t>
+            </a:r>
+            <a:endParaRPr lang="en-US" dirty="0"/>
+          </a:p>
+          <a:p>
+            <a:endParaRPr lang="en-US" dirty="0"/>
+          </a:p>
+        </p:txBody>
+      </p:sp>
+    </p:spTree>
+    <p:extLst>
+      <p:ext uri="{BB962C8B-B14F-4D97-AF65-F5344CB8AC3E}">
+        <p14:creationId xmlns:p14="http://schemas.microsoft.com/office/powerpoint/2010/main" val="3145259814"/>
+      </p:ext>
+    </p:extLst>
+  </p:cSld>
+  <p:clrMapOvr>
+    <a:masterClrMapping/>
+  </p:clrMapOvr>
+  <p:timing>
+    <p:tnLst>
+      <p:par>
+        <p:cTn id="1" dur="indefinite" restart="never" nodeType="tmRoot"/>
+      </p:par>
+    </p:tnLst>
+  </p:timing>
+</p:sld>
+</file>
+
+<file path=ppt/slides/slide19.xml><?xml version="1.0" encoding="utf-8"?>
+<p:sld xmlns:a="http://schemas.openxmlformats.org/drawingml/2006/main" xmlns:r="http://schemas.openxmlformats.org/officeDocument/2006/relationships" xmlns:p="http://schemas.openxmlformats.org/presentationml/2006/main">
+  <p:cSld>
+    <p:spTree>
+      <p:nvGrpSpPr>
+        <p:cNvPr id="1" name=""/>
+        <p:cNvGrpSpPr/>
+        <p:nvPr/>
+      </p:nvGrpSpPr>
+      <p:grpSpPr>
+        <a:xfrm>
+          <a:off x="0" y="0"/>
+          <a:ext cx="0" cy="0"/>
+          <a:chOff x="0" y="0"/>
+          <a:chExt cx="0" cy="0"/>
+        </a:xfrm>
+      </p:grpSpPr>
+      <p:sp>
+        <p:nvSpPr>
+          <p:cNvPr id="2" name="Title 1"/>
+          <p:cNvSpPr>
+            <a:spLocks noGrp="1"/>
+          </p:cNvSpPr>
+          <p:nvPr>
+            <p:ph type="title"/>
+          </p:nvPr>
+        </p:nvSpPr>
+        <p:spPr>
+          <a:xfrm>
+            <a:off x="304800" y="0"/>
+            <a:ext cx="8534400" cy="2054352"/>
+          </a:xfrm>
+        </p:spPr>
+        <p:txBody>
+          <a:bodyPr>
+            <a:normAutofit fontScale="90000"/>
+          </a:bodyPr>
+          <a:lstStyle/>
+          <a:p>
+            <a:r>
+              <a:rPr lang="en-US" sz="2800" b="1" dirty="0" smtClean="0"/>
+              <a:t>TEAM</a:t>
+            </a:r>
+            <a:r>
+              <a:rPr lang="en-US" sz="2800" b="1" dirty="0">
+                <a:solidFill>
+                  <a:srgbClr val="FF0000"/>
+                </a:solidFill>
+              </a:rPr>
+              <a:t>5</a:t>
+            </a:r>
+            <a:r>
+              <a:rPr lang="en-US" sz="2800" b="1" dirty="0" smtClean="0"/>
+              <a:t>O</a:t>
+            </a:r>
+            <a:r>
+              <a:rPr lang="en-US" sz="2800" b="1" dirty="0" smtClean="0">
+                <a:solidFill>
+                  <a:srgbClr val="FF0000"/>
+                </a:solidFill>
+              </a:rPr>
+              <a:t>AR</a:t>
+            </a:r>
+            <a:r>
+              <a:rPr lang="en-US" sz="2800" b="1" dirty="0" smtClean="0"/>
+              <a:t>S</a:t>
+            </a:r>
+            <a:r>
+              <a:rPr lang="en-US" sz="2800" dirty="0"/>
+              <a:t/>
+            </a:r>
+            <a:br>
+              <a:rPr lang="en-US" sz="2800" dirty="0"/>
+            </a:br>
+            <a:r>
+              <a:rPr lang="en-US" sz="2800" b="1" dirty="0"/>
+              <a:t>O</a:t>
+            </a:r>
+            <a:r>
+              <a:rPr lang="en-US" sz="2800" dirty="0"/>
+              <a:t>nline </a:t>
+            </a:r>
+            <a:r>
+              <a:rPr lang="en-US" sz="2800" b="1" dirty="0">
+                <a:solidFill>
+                  <a:srgbClr val="FF0000"/>
+                </a:solidFill>
+              </a:rPr>
+              <a:t>A</a:t>
+            </a:r>
+            <a:r>
+              <a:rPr lang="en-US" sz="2800" dirty="0"/>
+              <a:t>partment </a:t>
+            </a:r>
+            <a:r>
+              <a:rPr lang="en-US" sz="2800" b="1" dirty="0">
+                <a:solidFill>
+                  <a:srgbClr val="FF0000"/>
+                </a:solidFill>
+              </a:rPr>
+              <a:t>R</a:t>
+            </a:r>
+            <a:r>
+              <a:rPr lang="en-US" sz="2800" dirty="0"/>
+              <a:t>ental </a:t>
+            </a:r>
+            <a:r>
+              <a:rPr lang="en-US" sz="2800" b="1" dirty="0" smtClean="0"/>
+              <a:t>S</a:t>
+            </a:r>
+            <a:r>
+              <a:rPr lang="en-US" sz="2800" dirty="0" smtClean="0"/>
+              <a:t>ystem</a:t>
+            </a:r>
+            <a:br>
+              <a:rPr lang="en-US" sz="2800" dirty="0" smtClean="0"/>
+            </a:br>
+            <a:r>
+              <a:rPr lang="en-US" sz="3600" dirty="0" smtClean="0"/>
+              <a:t/>
+            </a:r>
+            <a:br>
+              <a:rPr lang="en-US" sz="3600" dirty="0" smtClean="0"/>
+            </a:br>
+            <a:r>
+              <a:rPr lang="en-US" sz="3600" dirty="0" smtClean="0"/>
+              <a:t>Contract: </a:t>
+            </a:r>
+            <a:r>
+              <a:rPr lang="en-US" dirty="0" smtClean="0"/>
+              <a:t>Software Requirements Specification</a:t>
+            </a:r>
+            <a:endParaRPr lang="en-US" dirty="0"/>
+          </a:p>
+        </p:txBody>
+      </p:sp>
+      <p:sp>
+        <p:nvSpPr>
+          <p:cNvPr id="3" name="Content Placeholder 2"/>
+          <p:cNvSpPr>
+            <a:spLocks noGrp="1"/>
+          </p:cNvSpPr>
+          <p:nvPr>
+            <p:ph sz="quarter" idx="1"/>
+          </p:nvPr>
+        </p:nvSpPr>
+        <p:spPr>
+          <a:xfrm>
+            <a:off x="-76200" y="1981200"/>
+            <a:ext cx="9220200" cy="4572000"/>
+          </a:xfrm>
+        </p:spPr>
+        <p:txBody>
+          <a:bodyPr/>
+          <a:lstStyle/>
+          <a:p>
+            <a:r>
+              <a:rPr lang="en-US" dirty="0" smtClean="0"/>
+              <a:t>Summary of </a:t>
+            </a:r>
+            <a:r>
+              <a:rPr lang="en-US" dirty="0" err="1" smtClean="0"/>
+              <a:t>Ucs</a:t>
+            </a:r>
+            <a:r>
+              <a:rPr lang="en-US" dirty="0" smtClean="0"/>
+              <a:t>;</a:t>
+            </a:r>
+          </a:p>
+          <a:p>
+            <a:r>
+              <a:rPr lang="en-US" dirty="0" smtClean="0"/>
+              <a:t>Table 3.2 Functional &amp; Non-Functional Requirements;</a:t>
+            </a:r>
+            <a:endParaRPr lang="en-US" dirty="0"/>
+          </a:p>
+          <a:p>
+            <a:r>
+              <a:rPr lang="en-US" dirty="0" smtClean="0"/>
+              <a:t>Appendix with Actors and UML USE CASE Diagram.</a:t>
+            </a:r>
+            <a:endParaRPr lang="en-US" dirty="0"/>
+          </a:p>
+          <a:p>
+            <a:endParaRPr lang="en-US" dirty="0"/>
+          </a:p>
+        </p:txBody>
+      </p:sp>
+    </p:spTree>
+    <p:extLst>
+      <p:ext uri="{BB962C8B-B14F-4D97-AF65-F5344CB8AC3E}">
+        <p14:creationId xmlns:p14="http://schemas.microsoft.com/office/powerpoint/2010/main" val="3552573354"/>
+      </p:ext>
+    </p:extLst>
+  </p:cSld>
+  <p:clrMapOvr>
+    <a:masterClrMapping/>
+  </p:clrMapOvr>
+</p:sld>
+</file>
+
+<file path=ppt/slides/slide2.xml><?xml version="1.0" encoding="utf-8"?>
+<p:sld xmlns:a="http://schemas.openxmlformats.org/drawingml/2006/main" xmlns:r="http://schemas.openxmlformats.org/officeDocument/2006/relationships" xmlns:p="http://schemas.openxmlformats.org/presentationml/2006/main">
+  <p:cSld>
+    <p:spTree>
+      <p:nvGrpSpPr>
+        <p:cNvPr id="1" name=""/>
+        <p:cNvGrpSpPr/>
+        <p:nvPr/>
+      </p:nvGrpSpPr>
+      <p:grpSpPr>
+        <a:xfrm>
+          <a:off x="0" y="0"/>
+          <a:ext cx="0" cy="0"/>
+          <a:chOff x="0" y="0"/>
+          <a:chExt cx="0" cy="0"/>
+        </a:xfrm>
+      </p:grpSpPr>
+      <p:sp>
+        <p:nvSpPr>
+          <p:cNvPr id="2" name="Title 1"/>
+          <p:cNvSpPr>
+            <a:spLocks noGrp="1"/>
+          </p:cNvSpPr>
+          <p:nvPr>
+            <p:ph type="title"/>
+          </p:nvPr>
+        </p:nvSpPr>
+        <p:spPr>
+          <a:xfrm>
+            <a:off x="304800" y="0"/>
+            <a:ext cx="8534400" cy="2054352"/>
+          </a:xfrm>
+        </p:spPr>
+        <p:txBody>
+          <a:bodyPr>
+            <a:normAutofit/>
+          </a:bodyPr>
+          <a:lstStyle/>
+          <a:p>
+            <a:r>
+              <a:rPr lang="en-US" sz="2800" b="1" dirty="0" smtClean="0"/>
+              <a:t>TEAM</a:t>
+            </a:r>
+            <a:r>
+              <a:rPr lang="en-US" sz="2800" b="1" dirty="0">
+                <a:solidFill>
+                  <a:srgbClr val="FF0000"/>
+                </a:solidFill>
+              </a:rPr>
+              <a:t>5</a:t>
+            </a:r>
+            <a:r>
+              <a:rPr lang="en-US" sz="2800" b="1" dirty="0" smtClean="0"/>
+              <a:t>O</a:t>
+            </a:r>
+            <a:r>
+              <a:rPr lang="en-US" sz="2800" b="1" dirty="0" smtClean="0">
+                <a:solidFill>
+                  <a:srgbClr val="FF0000"/>
+                </a:solidFill>
+              </a:rPr>
+              <a:t>AR</a:t>
+            </a:r>
+            <a:r>
+              <a:rPr lang="en-US" sz="2800" b="1" dirty="0" smtClean="0"/>
+              <a:t>S</a:t>
+            </a:r>
+            <a:r>
+              <a:rPr lang="en-US" sz="2800" dirty="0"/>
+              <a:t/>
+            </a:r>
+            <a:br>
+              <a:rPr lang="en-US" sz="2800" dirty="0"/>
+            </a:br>
+            <a:r>
+              <a:rPr lang="en-US" sz="2800" b="1" dirty="0"/>
+              <a:t>O</a:t>
+            </a:r>
+            <a:r>
+              <a:rPr lang="en-US" sz="2800" dirty="0"/>
+              <a:t>nline </a:t>
+            </a:r>
+            <a:r>
+              <a:rPr lang="en-US" sz="2800" b="1" dirty="0">
+                <a:solidFill>
+                  <a:srgbClr val="FF0000"/>
+                </a:solidFill>
+              </a:rPr>
+              <a:t>A</a:t>
+            </a:r>
+            <a:r>
+              <a:rPr lang="en-US" sz="2800" dirty="0"/>
+              <a:t>partment </a:t>
+            </a:r>
+            <a:r>
+              <a:rPr lang="en-US" sz="2800" b="1" dirty="0">
+                <a:solidFill>
+                  <a:srgbClr val="FF0000"/>
+                </a:solidFill>
+              </a:rPr>
+              <a:t>R</a:t>
+            </a:r>
+            <a:r>
+              <a:rPr lang="en-US" sz="2800" dirty="0"/>
+              <a:t>ental </a:t>
+            </a:r>
+            <a:r>
+              <a:rPr lang="en-US" sz="2800" b="1" dirty="0" smtClean="0"/>
+              <a:t>S</a:t>
+            </a:r>
+            <a:r>
+              <a:rPr lang="en-US" sz="2800" dirty="0" smtClean="0"/>
+              <a:t>ystem</a:t>
+            </a:r>
+            <a:r>
+              <a:rPr lang="en-US" sz="2000" dirty="0"/>
+              <a:t/>
+            </a:r>
+            <a:br>
+              <a:rPr lang="en-US" sz="2000" dirty="0"/>
+            </a:br>
+            <a:r>
+              <a:rPr lang="en-US" sz="3600" dirty="0"/>
+              <a:t/>
+            </a:r>
+            <a:br>
+              <a:rPr lang="en-US" sz="3600" dirty="0"/>
+            </a:br>
+            <a:r>
+              <a:rPr lang="en-US" dirty="0" smtClean="0">
+                <a:solidFill>
+                  <a:srgbClr val="FF0000"/>
+                </a:solidFill>
+              </a:rPr>
+              <a:t>DATABASE BACK END</a:t>
+            </a:r>
+            <a:endParaRPr lang="en-US" dirty="0">
+              <a:solidFill>
+                <a:srgbClr val="FF0000"/>
+              </a:solidFill>
+            </a:endParaRPr>
+          </a:p>
+        </p:txBody>
+      </p:sp>
+      <p:sp>
+        <p:nvSpPr>
+          <p:cNvPr id="3" name="Content Placeholder 2"/>
+          <p:cNvSpPr>
+            <a:spLocks noGrp="1"/>
+          </p:cNvSpPr>
+          <p:nvPr>
+            <p:ph sz="quarter" idx="1"/>
+          </p:nvPr>
+        </p:nvSpPr>
+        <p:spPr>
+          <a:xfrm>
+            <a:off x="320040" y="2261419"/>
+            <a:ext cx="8503920" cy="4572000"/>
+          </a:xfrm>
+        </p:spPr>
+        <p:txBody>
+          <a:bodyPr/>
+          <a:lstStyle/>
+          <a:p>
+            <a:r>
+              <a:rPr lang="en-US" dirty="0"/>
+              <a:t>Added by VH; Please discuss DB </a:t>
+            </a:r>
+            <a:r>
+              <a:rPr lang="en-US" dirty="0" smtClean="0"/>
+              <a:t>first</a:t>
+            </a:r>
+          </a:p>
+          <a:p>
+            <a:endParaRPr lang="en-US" dirty="0"/>
+          </a:p>
+          <a:p>
+            <a:r>
+              <a:rPr lang="en-US" dirty="0" smtClean="0"/>
+              <a:t>Please place these as dividers </a:t>
+            </a:r>
+            <a:endParaRPr lang="en-US" dirty="0"/>
+          </a:p>
+        </p:txBody>
+      </p:sp>
+    </p:spTree>
+    <p:extLst>
+      <p:ext uri="{BB962C8B-B14F-4D97-AF65-F5344CB8AC3E}">
+        <p14:creationId xmlns:p14="http://schemas.microsoft.com/office/powerpoint/2010/main" val="4266379870"/>
+      </p:ext>
+    </p:extLst>
+  </p:cSld>
+  <p:clrMapOvr>
+    <a:masterClrMapping/>
+  </p:clrMapOvr>
+  <p:timing>
+    <p:tnLst>
+      <p:par>
+        <p:cTn id="1" dur="indefinite" restart="never" nodeType="tmRoot"/>
+      </p:par>
+    </p:tnLst>
+  </p:timing>
+</p:sld>
+</file>
+
+<file path=ppt/slides/slide20.xml><?xml version="1.0" encoding="utf-8"?>
+<p:sld xmlns:a="http://schemas.openxmlformats.org/drawingml/2006/main" xmlns:r="http://schemas.openxmlformats.org/officeDocument/2006/relationships" xmlns:p="http://schemas.openxmlformats.org/presentationml/2006/main">
+  <p:cSld>
+    <p:spTree>
+      <p:nvGrpSpPr>
+        <p:cNvPr id="1" name=""/>
+        <p:cNvGrpSpPr/>
+        <p:nvPr/>
+      </p:nvGrpSpPr>
+      <p:grpSpPr>
+        <a:xfrm>
+          <a:off x="0" y="0"/>
+          <a:ext cx="0" cy="0"/>
+          <a:chOff x="0" y="0"/>
+          <a:chExt cx="0" cy="0"/>
+        </a:xfrm>
+      </p:grpSpPr>
+      <p:sp>
+        <p:nvSpPr>
+          <p:cNvPr id="2" name="Title 1"/>
+          <p:cNvSpPr>
+            <a:spLocks noGrp="1"/>
+          </p:cNvSpPr>
+          <p:nvPr>
+            <p:ph type="title"/>
+          </p:nvPr>
+        </p:nvSpPr>
+        <p:spPr>
+          <a:xfrm>
+            <a:off x="609600" y="-152400"/>
+            <a:ext cx="8534400" cy="2054352"/>
+          </a:xfrm>
+        </p:spPr>
+        <p:txBody>
+          <a:bodyPr>
+            <a:normAutofit/>
+          </a:bodyPr>
+          <a:lstStyle/>
+          <a:p>
+            <a:r>
+              <a:rPr lang="en-US" sz="2800" b="1" dirty="0" smtClean="0"/>
+              <a:t>TEAM</a:t>
+            </a:r>
+            <a:r>
+              <a:rPr lang="en-US" sz="2800" b="1" dirty="0">
+                <a:solidFill>
+                  <a:srgbClr val="FF0000"/>
+                </a:solidFill>
+              </a:rPr>
+              <a:t>5</a:t>
+            </a:r>
+            <a:r>
+              <a:rPr lang="en-US" sz="2800" b="1" dirty="0" smtClean="0"/>
+              <a:t>O</a:t>
+            </a:r>
+            <a:r>
+              <a:rPr lang="en-US" sz="2800" b="1" dirty="0" smtClean="0">
+                <a:solidFill>
+                  <a:srgbClr val="FF0000"/>
+                </a:solidFill>
+              </a:rPr>
+              <a:t>AR</a:t>
+            </a:r>
+            <a:r>
+              <a:rPr lang="en-US" sz="2800" b="1" dirty="0" smtClean="0"/>
+              <a:t>S</a:t>
+            </a:r>
+            <a:r>
+              <a:rPr lang="en-US" sz="2800" dirty="0"/>
+              <a:t/>
+            </a:r>
+            <a:br>
+              <a:rPr lang="en-US" sz="2800" dirty="0"/>
+            </a:br>
+            <a:r>
+              <a:rPr lang="en-US" sz="2800" b="1" dirty="0"/>
+              <a:t>O</a:t>
+            </a:r>
+            <a:r>
+              <a:rPr lang="en-US" sz="2800" dirty="0"/>
+              <a:t>nline </a:t>
+            </a:r>
+            <a:r>
+              <a:rPr lang="en-US" sz="2800" b="1" dirty="0">
+                <a:solidFill>
+                  <a:srgbClr val="FF0000"/>
+                </a:solidFill>
+              </a:rPr>
+              <a:t>A</a:t>
+            </a:r>
+            <a:r>
+              <a:rPr lang="en-US" sz="2800" dirty="0"/>
+              <a:t>partment </a:t>
+            </a:r>
+            <a:r>
+              <a:rPr lang="en-US" sz="2800" b="1" dirty="0">
+                <a:solidFill>
+                  <a:srgbClr val="FF0000"/>
+                </a:solidFill>
+              </a:rPr>
+              <a:t>R</a:t>
+            </a:r>
+            <a:r>
+              <a:rPr lang="en-US" sz="2800" dirty="0"/>
+              <a:t>ental </a:t>
+            </a:r>
+            <a:r>
+              <a:rPr lang="en-US" sz="2800" b="1" dirty="0"/>
+              <a:t>S</a:t>
+            </a:r>
+            <a:r>
+              <a:rPr lang="en-US" sz="2800" dirty="0"/>
+              <a:t>ystem </a:t>
+            </a:r>
+            <a:r>
+              <a:rPr lang="en-US" sz="2800" dirty="0" smtClean="0"/>
+              <a:t/>
+            </a:r>
+            <a:br>
+              <a:rPr lang="en-US" sz="2800" dirty="0" smtClean="0"/>
+            </a:br>
+            <a:r>
+              <a:rPr lang="en-US" sz="2800" dirty="0" smtClean="0"/>
+              <a:t/>
+            </a:r>
+            <a:br>
+              <a:rPr lang="en-US" sz="2800" dirty="0" smtClean="0"/>
+            </a:br>
+            <a:r>
+              <a:rPr lang="en-US" dirty="0" smtClean="0"/>
+              <a:t>Software Project Management Plan</a:t>
+            </a:r>
+            <a:endParaRPr lang="en-US" dirty="0"/>
+          </a:p>
+        </p:txBody>
+      </p:sp>
+      <p:sp>
+        <p:nvSpPr>
+          <p:cNvPr id="3" name="Content Placeholder 2"/>
+          <p:cNvSpPr>
+            <a:spLocks noGrp="1"/>
+          </p:cNvSpPr>
+          <p:nvPr>
+            <p:ph sz="quarter" idx="1"/>
+          </p:nvPr>
+        </p:nvSpPr>
+        <p:spPr>
+          <a:xfrm>
+            <a:off x="-76200" y="1981200"/>
+            <a:ext cx="9220200" cy="4572000"/>
+          </a:xfrm>
+        </p:spPr>
+        <p:txBody>
+          <a:bodyPr/>
+          <a:lstStyle/>
+          <a:p>
+            <a:r>
+              <a:rPr lang="en-US" dirty="0" smtClean="0"/>
+              <a:t>COCOMO II Estimates, screenshot of the CASE TOOL;</a:t>
+            </a:r>
+          </a:p>
+          <a:p>
+            <a:pPr marL="0" indent="0">
+              <a:buNone/>
+            </a:pPr>
+            <a:endParaRPr lang="en-US" dirty="0"/>
+          </a:p>
+        </p:txBody>
+      </p:sp>
+    </p:spTree>
+    <p:extLst>
+      <p:ext uri="{BB962C8B-B14F-4D97-AF65-F5344CB8AC3E}">
+        <p14:creationId xmlns:p14="http://schemas.microsoft.com/office/powerpoint/2010/main" val="1863565787"/>
+      </p:ext>
+    </p:extLst>
+  </p:cSld>
+  <p:clrMapOvr>
+    <a:masterClrMapping/>
+  </p:clrMapOvr>
+</p:sld>
+</file>
+
+<file path=ppt/slides/slide21.xml><?xml version="1.0" encoding="utf-8"?>
+<p:sld xmlns:a="http://schemas.openxmlformats.org/drawingml/2006/main" xmlns:r="http://schemas.openxmlformats.org/officeDocument/2006/relationships" xmlns:p="http://schemas.openxmlformats.org/presentationml/2006/main">
+  <p:cSld>
+    <p:spTree>
+      <p:nvGrpSpPr>
+        <p:cNvPr id="1" name=""/>
+        <p:cNvGrpSpPr/>
+        <p:nvPr/>
+      </p:nvGrpSpPr>
+      <p:grpSpPr>
+        <a:xfrm>
+          <a:off x="0" y="0"/>
+          <a:ext cx="0" cy="0"/>
+          <a:chOff x="0" y="0"/>
+          <a:chExt cx="0" cy="0"/>
+        </a:xfrm>
+      </p:grpSpPr>
+      <p:sp>
+        <p:nvSpPr>
+          <p:cNvPr id="5" name="Rectangle 4"/>
+          <p:cNvSpPr/>
+          <p:nvPr/>
+        </p:nvSpPr>
+        <p:spPr>
+          <a:xfrm>
+            <a:off x="4011" y="987552"/>
+            <a:ext cx="9139989" cy="5794248"/>
+          </a:xfrm>
+          <a:prstGeom prst="rect">
+            <a:avLst/>
+          </a:prstGeom>
+          <a:solidFill>
+            <a:schemeClr val="bg1"/>
+          </a:solidFill>
+          <a:ln>
+            <a:solidFill>
+              <a:schemeClr val="bg1"/>
+            </a:solidFill>
+          </a:ln>
+        </p:spPr>
+        <p:style>
+          <a:lnRef idx="2">
+            <a:schemeClr val="accent1">
+              <a:shade val="50000"/>
+            </a:schemeClr>
+          </a:lnRef>
+          <a:fillRef idx="1">
+            <a:schemeClr val="accent1"/>
+          </a:fillRef>
+          <a:effectRef idx="0">
+            <a:schemeClr val="accent1"/>
+          </a:effectRef>
+          <a:fontRef idx="minor">
+            <a:schemeClr val="lt1"/>
+          </a:fontRef>
+        </p:style>
+        <p:txBody>
+          <a:bodyPr rtlCol="0" anchor="ctr"/>
+          <a:lstStyle/>
+          <a:p>
+            <a:pPr algn="ctr"/>
+            <a:endParaRPr lang="en-US"/>
+          </a:p>
+        </p:txBody>
+      </p:sp>
+      <p:sp>
+        <p:nvSpPr>
+          <p:cNvPr id="2" name="Title 1"/>
+          <p:cNvSpPr>
+            <a:spLocks noGrp="1"/>
+          </p:cNvSpPr>
+          <p:nvPr>
+            <p:ph type="title"/>
+          </p:nvPr>
+        </p:nvSpPr>
+        <p:spPr/>
+        <p:txBody>
+          <a:bodyPr>
+            <a:normAutofit/>
+          </a:bodyPr>
+          <a:lstStyle/>
+          <a:p>
+            <a:r>
+              <a:rPr lang="en-US" dirty="0"/>
+              <a:t>MS Project </a:t>
+            </a:r>
+            <a:r>
+              <a:rPr lang="en-US" dirty="0" smtClean="0"/>
+              <a:t>Plan</a:t>
+            </a:r>
+            <a:endParaRPr lang="en-US" dirty="0"/>
+          </a:p>
+        </p:txBody>
+      </p:sp>
+      <p:sp>
+        <p:nvSpPr>
+          <p:cNvPr id="3" name="Content Placeholder 2"/>
+          <p:cNvSpPr>
+            <a:spLocks noGrp="1"/>
+          </p:cNvSpPr>
+          <p:nvPr>
+            <p:ph sz="quarter" idx="1"/>
+          </p:nvPr>
+        </p:nvSpPr>
+        <p:spPr/>
+        <p:txBody>
+          <a:bodyPr/>
+          <a:lstStyle/>
+          <a:p>
+            <a:endParaRPr lang="en-US"/>
+          </a:p>
+        </p:txBody>
+      </p:sp>
+      <p:pic>
+        <p:nvPicPr>
+          <p:cNvPr id="4" name="Picture 3"/>
+          <p:cNvPicPr>
+            <a:picLocks noChangeAspect="1"/>
+          </p:cNvPicPr>
+          <p:nvPr/>
+        </p:nvPicPr>
+        <p:blipFill rotWithShape="1">
+          <a:blip r:embed="rId2"/>
+          <a:srcRect l="44444" r="6667" b="15804"/>
+          <a:stretch/>
+        </p:blipFill>
+        <p:spPr>
+          <a:xfrm>
+            <a:off x="4010" y="987551"/>
+            <a:ext cx="9063789" cy="5550137"/>
+          </a:xfrm>
+          <a:prstGeom prst="rect">
+            <a:avLst/>
+          </a:prstGeom>
+        </p:spPr>
+      </p:pic>
+    </p:spTree>
+    <p:extLst>
+      <p:ext uri="{BB962C8B-B14F-4D97-AF65-F5344CB8AC3E}">
+        <p14:creationId xmlns:p14="http://schemas.microsoft.com/office/powerpoint/2010/main" val="3267790372"/>
+      </p:ext>
+    </p:extLst>
+  </p:cSld>
+  <p:clrMapOvr>
+    <a:masterClrMapping/>
+  </p:clrMapOvr>
+  <p:timing>
+    <p:tnLst>
+      <p:par>
+        <p:cTn id="1" dur="indefinite" restart="never" nodeType="tmRoot"/>
+      </p:par>
+    </p:tnLst>
+  </p:timing>
+</p:sld>
+</file>
+
+<file path=ppt/slides/slide22.xml><?xml version="1.0" encoding="utf-8"?>
+<p:sld xmlns:a="http://schemas.openxmlformats.org/drawingml/2006/main" xmlns:r="http://schemas.openxmlformats.org/officeDocument/2006/relationships" xmlns:p="http://schemas.openxmlformats.org/presentationml/2006/main">
+  <p:cSld>
+    <p:spTree>
+      <p:nvGrpSpPr>
+        <p:cNvPr id="1" name=""/>
+        <p:cNvGrpSpPr/>
+        <p:nvPr/>
+      </p:nvGrpSpPr>
+      <p:grpSpPr>
+        <a:xfrm>
+          <a:off x="0" y="0"/>
+          <a:ext cx="0" cy="0"/>
+          <a:chOff x="0" y="0"/>
+          <a:chExt cx="0" cy="0"/>
+        </a:xfrm>
+      </p:grpSpPr>
+      <p:sp>
+        <p:nvSpPr>
+          <p:cNvPr id="2" name="Title 1"/>
+          <p:cNvSpPr>
+            <a:spLocks noGrp="1"/>
+          </p:cNvSpPr>
+          <p:nvPr>
+            <p:ph type="title"/>
+          </p:nvPr>
+        </p:nvSpPr>
+        <p:spPr>
+          <a:xfrm>
+            <a:off x="304800" y="0"/>
+            <a:ext cx="8534400" cy="2054352"/>
+          </a:xfrm>
+        </p:spPr>
+        <p:txBody>
+          <a:bodyPr>
+            <a:normAutofit/>
+          </a:bodyPr>
+          <a:lstStyle/>
+          <a:p>
+            <a:r>
+              <a:rPr lang="en-US" sz="2800" b="1" dirty="0" smtClean="0"/>
+              <a:t>TEAM</a:t>
+            </a:r>
+            <a:r>
+              <a:rPr lang="en-US" sz="2800" b="1" dirty="0">
+                <a:solidFill>
+                  <a:srgbClr val="FF0000"/>
+                </a:solidFill>
+              </a:rPr>
+              <a:t>5</a:t>
+            </a:r>
+            <a:r>
+              <a:rPr lang="en-US" sz="2800" b="1" dirty="0" smtClean="0"/>
+              <a:t>O</a:t>
+            </a:r>
+            <a:r>
+              <a:rPr lang="en-US" sz="2800" b="1" dirty="0" smtClean="0">
+                <a:solidFill>
+                  <a:srgbClr val="FF0000"/>
+                </a:solidFill>
+              </a:rPr>
+              <a:t>AR</a:t>
+            </a:r>
+            <a:r>
+              <a:rPr lang="en-US" sz="2800" b="1" dirty="0" smtClean="0"/>
+              <a:t>S</a:t>
+            </a:r>
+            <a:r>
+              <a:rPr lang="en-US" sz="2800" dirty="0"/>
+              <a:t/>
+            </a:r>
+            <a:br>
+              <a:rPr lang="en-US" sz="2800" dirty="0"/>
+            </a:br>
+            <a:r>
+              <a:rPr lang="en-US" sz="2800" b="1" dirty="0"/>
+              <a:t>O</a:t>
+            </a:r>
+            <a:r>
+              <a:rPr lang="en-US" sz="2800" dirty="0"/>
+              <a:t>nline </a:t>
+            </a:r>
+            <a:r>
+              <a:rPr lang="en-US" sz="2800" b="1" dirty="0">
+                <a:solidFill>
+                  <a:srgbClr val="FF0000"/>
+                </a:solidFill>
+              </a:rPr>
+              <a:t>A</a:t>
+            </a:r>
+            <a:r>
+              <a:rPr lang="en-US" sz="2800" dirty="0"/>
+              <a:t>partment </a:t>
+            </a:r>
+            <a:r>
+              <a:rPr lang="en-US" sz="2800" b="1" dirty="0">
+                <a:solidFill>
+                  <a:srgbClr val="FF0000"/>
+                </a:solidFill>
+              </a:rPr>
+              <a:t>R</a:t>
+            </a:r>
+            <a:r>
+              <a:rPr lang="en-US" sz="2800" dirty="0"/>
+              <a:t>ental </a:t>
+            </a:r>
+            <a:r>
+              <a:rPr lang="en-US" sz="2800" b="1" dirty="0"/>
+              <a:t>S</a:t>
+            </a:r>
+            <a:r>
+              <a:rPr lang="en-US" sz="2800" dirty="0"/>
+              <a:t>ystem</a:t>
+            </a:r>
+            <a:r>
+              <a:rPr lang="en-US" sz="3600" dirty="0">
+                <a:solidFill>
+                  <a:srgbClr val="8CADAE">
+                    <a:shade val="75000"/>
+                  </a:srgbClr>
+                </a:solidFill>
+              </a:rPr>
+              <a:t/>
+            </a:r>
+            <a:br>
+              <a:rPr lang="en-US" sz="3600" dirty="0">
+                <a:solidFill>
+                  <a:srgbClr val="8CADAE">
+                    <a:shade val="75000"/>
+                  </a:srgbClr>
+                </a:solidFill>
+              </a:rPr>
+            </a:br>
+            <a:r>
+              <a:rPr lang="en-US" sz="3600" dirty="0" smtClean="0"/>
+              <a:t/>
+            </a:r>
+            <a:br>
+              <a:rPr lang="en-US" sz="3600" dirty="0" smtClean="0"/>
+            </a:br>
+            <a:r>
+              <a:rPr lang="en-US" dirty="0" smtClean="0"/>
+              <a:t>Chat Demo</a:t>
+            </a:r>
+            <a:endParaRPr lang="en-US" dirty="0"/>
+          </a:p>
+        </p:txBody>
+      </p:sp>
+      <p:sp>
+        <p:nvSpPr>
+          <p:cNvPr id="3" name="Content Placeholder 2"/>
+          <p:cNvSpPr>
+            <a:spLocks noGrp="1"/>
+          </p:cNvSpPr>
+          <p:nvPr>
+            <p:ph sz="quarter" idx="1"/>
+          </p:nvPr>
+        </p:nvSpPr>
+        <p:spPr>
+          <a:xfrm>
+            <a:off x="30480" y="1981200"/>
+            <a:ext cx="9220200" cy="4572000"/>
+          </a:xfrm>
+        </p:spPr>
+        <p:txBody>
+          <a:bodyPr/>
+          <a:lstStyle/>
+          <a:p>
+            <a:r>
+              <a:rPr lang="en-US" dirty="0" smtClean="0">
+                <a:latin typeface="Arial" panose="020B0604020202020204" pitchFamily="34" charset="0"/>
+                <a:cs typeface="Arial" panose="020B0604020202020204" pitchFamily="34" charset="0"/>
+              </a:rPr>
+              <a:t>Go to purechat.com &gt; Sign up &gt; Copy snippet code &gt; paste before end of &lt;/body&gt;</a:t>
+            </a:r>
+            <a:r>
+              <a:rPr lang="en-US" sz="4400" dirty="0">
+                <a:solidFill>
+                  <a:srgbClr val="8CADAE">
+                    <a:shade val="75000"/>
+                  </a:srgbClr>
+                </a:solidFill>
+              </a:rPr>
+              <a:t/>
+            </a:r>
+            <a:br>
+              <a:rPr lang="en-US" sz="4400" dirty="0">
+                <a:solidFill>
+                  <a:srgbClr val="8CADAE">
+                    <a:shade val="75000"/>
+                  </a:srgbClr>
+                </a:solidFill>
+              </a:rPr>
+            </a:br>
+            <a:endParaRPr lang="en-US" dirty="0"/>
+          </a:p>
+          <a:p>
+            <a:r>
+              <a:rPr lang="en-US" dirty="0" smtClean="0"/>
+              <a:t>Live Chat demo.</a:t>
+            </a:r>
+            <a:endParaRPr lang="en-US" dirty="0"/>
+          </a:p>
+        </p:txBody>
+      </p:sp>
+    </p:spTree>
+    <p:extLst>
+      <p:ext uri="{BB962C8B-B14F-4D97-AF65-F5344CB8AC3E}">
+        <p14:creationId xmlns:p14="http://schemas.microsoft.com/office/powerpoint/2010/main" val="2971098582"/>
+      </p:ext>
+    </p:extLst>
+  </p:cSld>
+  <p:clrMapOvr>
+    <a:masterClrMapping/>
+  </p:clrMapOvr>
+  <p:timing>
+    <p:tnLst>
+      <p:par>
+        <p:cTn id="1" dur="indefinite" restart="never" nodeType="tmRoot"/>
+      </p:par>
+    </p:tnLst>
+  </p:timing>
+</p:sld>
+</file>
+
+<file path=ppt/slides/slide3.xml><?xml version="1.0" encoding="utf-8"?>
+<p:sld xmlns:a="http://schemas.openxmlformats.org/drawingml/2006/main" xmlns:r="http://schemas.openxmlformats.org/officeDocument/2006/relationships" xmlns:p="http://schemas.openxmlformats.org/presentationml/2006/main">
+  <p:cSld>
+    <p:spTree>
+      <p:nvGrpSpPr>
+        <p:cNvPr id="1" name=""/>
+        <p:cNvGrpSpPr/>
+        <p:nvPr/>
+      </p:nvGrpSpPr>
+      <p:grpSpPr>
+        <a:xfrm>
+          <a:off x="0" y="0"/>
+          <a:ext cx="0" cy="0"/>
+          <a:chOff x="0" y="0"/>
+          <a:chExt cx="0" cy="0"/>
+        </a:xfrm>
+      </p:grpSpPr>
+      <p:sp>
+        <p:nvSpPr>
+          <p:cNvPr id="2" name="Title 1"/>
+          <p:cNvSpPr>
+            <a:spLocks noGrp="1"/>
+          </p:cNvSpPr>
+          <p:nvPr>
+            <p:ph type="title"/>
+          </p:nvPr>
+        </p:nvSpPr>
+        <p:spPr>
+          <a:xfrm>
+            <a:off x="381000" y="-301752"/>
+            <a:ext cx="8534400" cy="2054352"/>
+          </a:xfrm>
+        </p:spPr>
+        <p:txBody>
+          <a:bodyPr>
+            <a:normAutofit/>
+          </a:bodyPr>
+          <a:lstStyle/>
+          <a:p>
+            <a:r>
+              <a:rPr lang="en-US" sz="2400" b="1" dirty="0" smtClean="0"/>
+              <a:t>TEAM</a:t>
+            </a:r>
+            <a:r>
+              <a:rPr lang="en-US" sz="2400" b="1" dirty="0">
+                <a:solidFill>
+                  <a:srgbClr val="FF0000"/>
+                </a:solidFill>
+              </a:rPr>
+              <a:t>5</a:t>
+            </a:r>
+            <a:r>
+              <a:rPr lang="en-US" sz="2400" b="1" dirty="0" smtClean="0"/>
+              <a:t>O</a:t>
+            </a:r>
+            <a:r>
+              <a:rPr lang="en-US" sz="2400" b="1" dirty="0" smtClean="0">
+                <a:solidFill>
+                  <a:srgbClr val="FF0000"/>
+                </a:solidFill>
+              </a:rPr>
+              <a:t>AR</a:t>
+            </a:r>
+            <a:r>
+              <a:rPr lang="en-US" sz="2400" b="1" dirty="0" smtClean="0"/>
+              <a:t>S</a:t>
+            </a:r>
+            <a:r>
+              <a:rPr lang="en-US" sz="2400" dirty="0"/>
+              <a:t/>
+            </a:r>
+            <a:br>
+              <a:rPr lang="en-US" sz="2400" dirty="0"/>
+            </a:br>
+            <a:r>
+              <a:rPr lang="en-US" sz="2400" b="1" dirty="0"/>
+              <a:t>O</a:t>
+            </a:r>
+            <a:r>
+              <a:rPr lang="en-US" sz="2400" dirty="0"/>
+              <a:t>nline </a:t>
+            </a:r>
+            <a:r>
+              <a:rPr lang="en-US" sz="2400" b="1" dirty="0">
+                <a:solidFill>
+                  <a:srgbClr val="FF0000"/>
+                </a:solidFill>
+              </a:rPr>
+              <a:t>A</a:t>
+            </a:r>
+            <a:r>
+              <a:rPr lang="en-US" sz="2400" dirty="0"/>
+              <a:t>partment </a:t>
+            </a:r>
+            <a:r>
+              <a:rPr lang="en-US" sz="2400" b="1" dirty="0">
+                <a:solidFill>
+                  <a:srgbClr val="FF0000"/>
+                </a:solidFill>
+              </a:rPr>
+              <a:t>R</a:t>
+            </a:r>
+            <a:r>
+              <a:rPr lang="en-US" sz="2400" dirty="0"/>
+              <a:t>ental </a:t>
+            </a:r>
+            <a:r>
+              <a:rPr lang="en-US" sz="2400" b="1" dirty="0" smtClean="0"/>
+              <a:t>S</a:t>
+            </a:r>
+            <a:r>
+              <a:rPr lang="en-US" sz="2400" dirty="0" smtClean="0"/>
+              <a:t>ystem</a:t>
+            </a:r>
+            <a:r>
+              <a:rPr lang="en-US" sz="2400" dirty="0"/>
+              <a:t/>
+            </a:r>
+            <a:br>
+              <a:rPr lang="en-US" sz="2400" dirty="0"/>
+            </a:br>
+            <a:r>
+              <a:rPr lang="en-US" sz="2400" dirty="0"/>
+              <a:t/>
+            </a:r>
+            <a:br>
+              <a:rPr lang="en-US" sz="2400" dirty="0"/>
+            </a:br>
+            <a:r>
+              <a:rPr lang="en-US" dirty="0" smtClean="0"/>
+              <a:t>Data Analysis – ERD Model</a:t>
+            </a:r>
+            <a:endParaRPr lang="en-US" dirty="0"/>
+          </a:p>
+        </p:txBody>
+      </p:sp>
+      <p:pic>
+        <p:nvPicPr>
+          <p:cNvPr id="4" name="Picture 3"/>
+          <p:cNvPicPr>
+            <a:picLocks noChangeAspect="1"/>
+          </p:cNvPicPr>
+          <p:nvPr/>
+        </p:nvPicPr>
+        <p:blipFill>
+          <a:blip r:embed="rId2"/>
+          <a:stretch>
+            <a:fillRect/>
+          </a:stretch>
+        </p:blipFill>
+        <p:spPr>
+          <a:xfrm>
+            <a:off x="413982" y="1686602"/>
+            <a:ext cx="4234218" cy="4969254"/>
+          </a:xfrm>
+          <a:prstGeom prst="rect">
+            <a:avLst/>
+          </a:prstGeom>
+        </p:spPr>
+      </p:pic>
+    </p:spTree>
+    <p:extLst>
+      <p:ext uri="{BB962C8B-B14F-4D97-AF65-F5344CB8AC3E}">
+        <p14:creationId xmlns:p14="http://schemas.microsoft.com/office/powerpoint/2010/main" val="2922699264"/>
+      </p:ext>
+    </p:extLst>
+  </p:cSld>
+  <p:clrMapOvr>
+    <a:masterClrMapping/>
+  </p:clrMapOvr>
+  <p:timing>
+    <p:tnLst>
+      <p:par>
+        <p:cTn id="1" dur="indefinite" restart="never" nodeType="tmRoot"/>
+      </p:par>
+    </p:tnLst>
+  </p:timing>
+</p:sld>
+</file>
+
+<file path=ppt/slides/slide4.xml><?xml version="1.0" encoding="utf-8"?>
+<p:sld xmlns:a="http://schemas.openxmlformats.org/drawingml/2006/main" xmlns:r="http://schemas.openxmlformats.org/officeDocument/2006/relationships" xmlns:p="http://schemas.openxmlformats.org/presentationml/2006/main">
+  <p:cSld>
+    <p:spTree>
+      <p:nvGrpSpPr>
+        <p:cNvPr id="1" name=""/>
+        <p:cNvGrpSpPr/>
+        <p:nvPr/>
+      </p:nvGrpSpPr>
+      <p:grpSpPr>
+        <a:xfrm>
+          <a:off x="0" y="0"/>
+          <a:ext cx="0" cy="0"/>
+          <a:chOff x="0" y="0"/>
+          <a:chExt cx="0" cy="0"/>
+        </a:xfrm>
+      </p:grpSpPr>
+      <p:sp>
+        <p:nvSpPr>
+          <p:cNvPr id="2" name="Title 1"/>
+          <p:cNvSpPr>
+            <a:spLocks noGrp="1"/>
+          </p:cNvSpPr>
+          <p:nvPr>
+            <p:ph type="title"/>
+          </p:nvPr>
+        </p:nvSpPr>
+        <p:spPr>
+          <a:xfrm>
+            <a:off x="304800" y="-225552"/>
+            <a:ext cx="8534400" cy="2054352"/>
+          </a:xfrm>
+        </p:spPr>
+        <p:txBody>
+          <a:bodyPr>
+            <a:normAutofit/>
+          </a:bodyPr>
+          <a:lstStyle/>
+          <a:p>
+            <a:r>
+              <a:rPr lang="en-US" sz="2400" b="1" dirty="0" smtClean="0"/>
+              <a:t>TEAM</a:t>
+            </a:r>
+            <a:r>
+              <a:rPr lang="en-US" sz="2400" b="1" dirty="0">
+                <a:solidFill>
+                  <a:srgbClr val="FF0000"/>
+                </a:solidFill>
+              </a:rPr>
+              <a:t>5</a:t>
+            </a:r>
+            <a:r>
+              <a:rPr lang="en-US" sz="2400" b="1" dirty="0" smtClean="0"/>
+              <a:t>O</a:t>
+            </a:r>
+            <a:r>
+              <a:rPr lang="en-US" sz="2400" b="1" dirty="0" smtClean="0">
+                <a:solidFill>
+                  <a:srgbClr val="FF0000"/>
+                </a:solidFill>
+              </a:rPr>
+              <a:t>AR</a:t>
+            </a:r>
+            <a:r>
+              <a:rPr lang="en-US" sz="2400" b="1" dirty="0" smtClean="0"/>
+              <a:t>S</a:t>
+            </a:r>
+            <a:r>
+              <a:rPr lang="en-US" sz="2400" dirty="0"/>
+              <a:t/>
+            </a:r>
+            <a:br>
+              <a:rPr lang="en-US" sz="2400" dirty="0"/>
+            </a:br>
+            <a:r>
+              <a:rPr lang="en-US" sz="2400" b="1" dirty="0"/>
+              <a:t>O</a:t>
+            </a:r>
+            <a:r>
+              <a:rPr lang="en-US" sz="2400" dirty="0"/>
+              <a:t>nline </a:t>
+            </a:r>
+            <a:r>
+              <a:rPr lang="en-US" sz="2400" b="1" dirty="0">
+                <a:solidFill>
+                  <a:srgbClr val="FF0000"/>
+                </a:solidFill>
+              </a:rPr>
+              <a:t>A</a:t>
+            </a:r>
+            <a:r>
+              <a:rPr lang="en-US" sz="2400" dirty="0"/>
+              <a:t>partment </a:t>
+            </a:r>
+            <a:r>
+              <a:rPr lang="en-US" sz="2400" b="1" dirty="0">
+                <a:solidFill>
+                  <a:srgbClr val="FF0000"/>
+                </a:solidFill>
+              </a:rPr>
+              <a:t>R</a:t>
+            </a:r>
+            <a:r>
+              <a:rPr lang="en-US" sz="2400" dirty="0"/>
+              <a:t>ental </a:t>
+            </a:r>
+            <a:r>
+              <a:rPr lang="en-US" sz="2400" b="1" dirty="0"/>
+              <a:t>S</a:t>
+            </a:r>
+            <a:r>
+              <a:rPr lang="en-US" sz="2400" dirty="0"/>
+              <a:t>ystem</a:t>
+            </a:r>
+            <a:br>
+              <a:rPr lang="en-US" sz="2400" dirty="0"/>
+            </a:br>
+            <a:r>
+              <a:rPr lang="en-US" sz="3600" dirty="0"/>
+              <a:t/>
+            </a:r>
+            <a:br>
+              <a:rPr lang="en-US" sz="3600" dirty="0"/>
+            </a:br>
+            <a:r>
+              <a:rPr lang="en-US" dirty="0" smtClean="0"/>
+              <a:t>Contract – Data Requirements Specification</a:t>
+            </a:r>
+            <a:endParaRPr lang="en-US" dirty="0"/>
+          </a:p>
+        </p:txBody>
+      </p:sp>
+      <p:pic>
+        <p:nvPicPr>
+          <p:cNvPr id="4" name="Content Placeholder 3"/>
+          <p:cNvPicPr>
+            <a:picLocks noGrp="1" noChangeAspect="1"/>
+          </p:cNvPicPr>
+          <p:nvPr>
+            <p:ph sz="quarter" idx="1"/>
+          </p:nvPr>
+        </p:nvPicPr>
+        <p:blipFill>
+          <a:blip r:embed="rId2"/>
+          <a:stretch>
+            <a:fillRect/>
+          </a:stretch>
+        </p:blipFill>
+        <p:spPr>
+          <a:xfrm>
+            <a:off x="299113" y="2612488"/>
+            <a:ext cx="4048092" cy="3733800"/>
+          </a:xfrm>
+          <a:prstGeom prst="rect">
+            <a:avLst/>
+          </a:prstGeom>
+        </p:spPr>
+      </p:pic>
+      <p:pic>
+        <p:nvPicPr>
+          <p:cNvPr id="5" name="Picture 4"/>
+          <p:cNvPicPr>
+            <a:picLocks noChangeAspect="1"/>
+          </p:cNvPicPr>
+          <p:nvPr/>
+        </p:nvPicPr>
+        <p:blipFill>
+          <a:blip r:embed="rId3"/>
+          <a:stretch>
+            <a:fillRect/>
+          </a:stretch>
+        </p:blipFill>
+        <p:spPr>
+          <a:xfrm>
+            <a:off x="4724400" y="1704059"/>
+            <a:ext cx="3733800" cy="4667250"/>
+          </a:xfrm>
+          <a:prstGeom prst="rect">
+            <a:avLst/>
+          </a:prstGeom>
+        </p:spPr>
+      </p:pic>
+      <p:sp>
+        <p:nvSpPr>
+          <p:cNvPr id="6" name="TextBox 5"/>
+          <p:cNvSpPr txBox="1"/>
+          <p:nvPr/>
+        </p:nvSpPr>
+        <p:spPr>
+          <a:xfrm>
+            <a:off x="299113" y="1851312"/>
+            <a:ext cx="3895692" cy="369332"/>
+          </a:xfrm>
+          <a:prstGeom prst="rect">
+            <a:avLst/>
+          </a:prstGeom>
+          <a:noFill/>
+        </p:spPr>
+        <p:txBody>
+          <a:bodyPr wrap="square" rtlCol="0">
+            <a:spAutoFit/>
+          </a:bodyPr>
+          <a:lstStyle/>
+          <a:p>
+            <a:r>
+              <a:rPr lang="en-US" dirty="0" smtClean="0"/>
+              <a:t>Table 1 Data Requirements</a:t>
+            </a:r>
+            <a:endParaRPr lang="en-US" dirty="0"/>
+          </a:p>
+        </p:txBody>
+      </p:sp>
+    </p:spTree>
+    <p:extLst>
+      <p:ext uri="{BB962C8B-B14F-4D97-AF65-F5344CB8AC3E}">
+        <p14:creationId xmlns:p14="http://schemas.microsoft.com/office/powerpoint/2010/main" val="3418980167"/>
+      </p:ext>
+    </p:extLst>
+  </p:cSld>
+  <p:clrMapOvr>
+    <a:masterClrMapping/>
+  </p:clrMapOvr>
+  <p:timing>
+    <p:tnLst>
+      <p:par>
+        <p:cTn id="1" dur="indefinite" restart="never" nodeType="tmRoot"/>
+      </p:par>
+    </p:tnLst>
+  </p:timing>
+</p:sld>
+</file>
+
+<file path=ppt/slides/slide5.xml><?xml version="1.0" encoding="utf-8"?>
+<p:sld xmlns:a="http://schemas.openxmlformats.org/drawingml/2006/main" xmlns:r="http://schemas.openxmlformats.org/officeDocument/2006/relationships" xmlns:p="http://schemas.openxmlformats.org/presentationml/2006/main">
+  <p:cSld>
+    <p:spTree>
+      <p:nvGrpSpPr>
+        <p:cNvPr id="1" name=""/>
+        <p:cNvGrpSpPr/>
+        <p:nvPr/>
+      </p:nvGrpSpPr>
+      <p:grpSpPr>
+        <a:xfrm>
+          <a:off x="0" y="0"/>
+          <a:ext cx="0" cy="0"/>
+          <a:chOff x="0" y="0"/>
+          <a:chExt cx="0" cy="0"/>
+        </a:xfrm>
+      </p:grpSpPr>
+      <p:sp>
+        <p:nvSpPr>
+          <p:cNvPr id="2" name="Title 1"/>
+          <p:cNvSpPr>
+            <a:spLocks noGrp="1"/>
+          </p:cNvSpPr>
+          <p:nvPr>
+            <p:ph type="title"/>
+          </p:nvPr>
+        </p:nvSpPr>
+        <p:spPr>
+          <a:xfrm>
+            <a:off x="304800" y="0"/>
+            <a:ext cx="8534400" cy="2054352"/>
+          </a:xfrm>
+        </p:spPr>
+        <p:txBody>
+          <a:bodyPr>
+            <a:normAutofit/>
+          </a:bodyPr>
+          <a:lstStyle/>
+          <a:p>
+            <a:r>
+              <a:rPr lang="en-US" sz="2400" b="1" dirty="0" smtClean="0"/>
+              <a:t>TEAM</a:t>
+            </a:r>
+            <a:r>
+              <a:rPr lang="en-US" sz="2400" b="1" dirty="0">
+                <a:solidFill>
+                  <a:srgbClr val="FF0000"/>
+                </a:solidFill>
+              </a:rPr>
+              <a:t>5</a:t>
+            </a:r>
+            <a:r>
+              <a:rPr lang="en-US" sz="2400" b="1" dirty="0" smtClean="0"/>
+              <a:t>O</a:t>
+            </a:r>
+            <a:r>
+              <a:rPr lang="en-US" sz="2400" b="1" dirty="0" smtClean="0">
+                <a:solidFill>
+                  <a:srgbClr val="FF0000"/>
+                </a:solidFill>
+              </a:rPr>
+              <a:t>AR</a:t>
+            </a:r>
+            <a:r>
+              <a:rPr lang="en-US" sz="2400" b="1" dirty="0" smtClean="0"/>
+              <a:t>S</a:t>
+            </a:r>
+            <a:r>
+              <a:rPr lang="en-US" sz="2400" dirty="0"/>
+              <a:t/>
+            </a:r>
+            <a:br>
+              <a:rPr lang="en-US" sz="2400" dirty="0"/>
+            </a:br>
+            <a:r>
+              <a:rPr lang="en-US" sz="2400" b="1" dirty="0"/>
+              <a:t>O</a:t>
+            </a:r>
+            <a:r>
+              <a:rPr lang="en-US" sz="2400" dirty="0"/>
+              <a:t>nline </a:t>
+            </a:r>
+            <a:r>
+              <a:rPr lang="en-US" sz="2400" b="1" dirty="0">
+                <a:solidFill>
+                  <a:srgbClr val="FF0000"/>
+                </a:solidFill>
+              </a:rPr>
+              <a:t>A</a:t>
+            </a:r>
+            <a:r>
+              <a:rPr lang="en-US" sz="2400" dirty="0"/>
+              <a:t>partment </a:t>
+            </a:r>
+            <a:r>
+              <a:rPr lang="en-US" sz="2400" b="1" dirty="0">
+                <a:solidFill>
+                  <a:srgbClr val="FF0000"/>
+                </a:solidFill>
+              </a:rPr>
+              <a:t>R</a:t>
+            </a:r>
+            <a:r>
+              <a:rPr lang="en-US" sz="2400" dirty="0"/>
+              <a:t>ental </a:t>
+            </a:r>
+            <a:r>
+              <a:rPr lang="en-US" sz="2400" b="1" dirty="0"/>
+              <a:t>S</a:t>
+            </a:r>
+            <a:r>
+              <a:rPr lang="en-US" sz="2400" dirty="0"/>
+              <a:t>ystem</a:t>
+            </a:r>
+            <a:br>
+              <a:rPr lang="en-US" sz="2400" dirty="0"/>
+            </a:br>
+            <a:r>
+              <a:rPr lang="en-US" sz="3600" dirty="0"/>
+              <a:t/>
+            </a:r>
+            <a:br>
+              <a:rPr lang="en-US" sz="3600" dirty="0"/>
+            </a:br>
+            <a:r>
+              <a:rPr lang="en-US" dirty="0" smtClean="0"/>
+              <a:t>Contract – Data Requirements Specification</a:t>
+            </a:r>
+            <a:endParaRPr lang="en-US" dirty="0"/>
+          </a:p>
+        </p:txBody>
+      </p:sp>
+      <p:pic>
+        <p:nvPicPr>
+          <p:cNvPr id="4" name="Content Placeholder 3"/>
+          <p:cNvPicPr>
+            <a:picLocks noGrp="1" noChangeAspect="1"/>
+          </p:cNvPicPr>
+          <p:nvPr>
+            <p:ph sz="quarter" idx="1"/>
+          </p:nvPr>
+        </p:nvPicPr>
+        <p:blipFill>
+          <a:blip r:embed="rId2"/>
+          <a:stretch>
+            <a:fillRect/>
+          </a:stretch>
+        </p:blipFill>
+        <p:spPr>
+          <a:xfrm>
+            <a:off x="3657600" y="1999516"/>
+            <a:ext cx="3886200" cy="4624232"/>
+          </a:xfrm>
+          <a:prstGeom prst="rect">
+            <a:avLst/>
+          </a:prstGeom>
+        </p:spPr>
+      </p:pic>
+      <p:sp>
+        <p:nvSpPr>
+          <p:cNvPr id="5" name="TextBox 4"/>
+          <p:cNvSpPr txBox="1"/>
+          <p:nvPr/>
+        </p:nvSpPr>
+        <p:spPr>
+          <a:xfrm>
+            <a:off x="609600" y="2209800"/>
+            <a:ext cx="2819400" cy="369332"/>
+          </a:xfrm>
+          <a:prstGeom prst="rect">
+            <a:avLst/>
+          </a:prstGeom>
+          <a:noFill/>
+        </p:spPr>
+        <p:txBody>
+          <a:bodyPr wrap="square" rtlCol="0">
+            <a:spAutoFit/>
+          </a:bodyPr>
+          <a:lstStyle/>
+          <a:p>
+            <a:r>
+              <a:rPr lang="en-US" dirty="0" smtClean="0"/>
+              <a:t>Table 1 – Continued </a:t>
+            </a:r>
+            <a:endParaRPr lang="en-US" dirty="0"/>
+          </a:p>
+        </p:txBody>
+      </p:sp>
+    </p:spTree>
+    <p:extLst>
+      <p:ext uri="{BB962C8B-B14F-4D97-AF65-F5344CB8AC3E}">
+        <p14:creationId xmlns:p14="http://schemas.microsoft.com/office/powerpoint/2010/main" val="1709730969"/>
+      </p:ext>
+    </p:extLst>
+  </p:cSld>
+  <p:clrMapOvr>
+    <a:masterClrMapping/>
+  </p:clrMapOvr>
+  <p:timing>
+    <p:tnLst>
+      <p:par>
+        <p:cTn id="1" dur="indefinite" restart="never" nodeType="tmRoot"/>
+      </p:par>
+    </p:tnLst>
+  </p:timing>
 </p:sld>
 </file>
 
@@ -7798,7 +10411,7 @@
         </p:nvSpPr>
         <p:spPr>
           <a:xfrm>
-            <a:off x="304800" y="0"/>
+            <a:off x="304800" y="-225552"/>
             <a:ext cx="8534400" cy="2054352"/>
           </a:xfrm>
         </p:spPr>
@@ -7810,7 +10423,19 @@
           <a:p>
             <a:r>
               <a:rPr lang="en-US" sz="2400" b="1" dirty="0" smtClean="0"/>
-              <a:t>TEAMO</a:t>
+              <a:t>TEAM</a:t>
+            </a:r>
+            <a:r>
+              <a:rPr lang="en-US" sz="2400" b="1" dirty="0">
+                <a:solidFill>
+                  <a:srgbClr val="FF0000"/>
+                </a:solidFill>
+              </a:rPr>
+              <a:t>5</a:t>
+            </a:r>
+            <a:r>
+              <a:rPr lang="en-US" sz="2400" b="1" dirty="0" smtClean="0"/>
+              <a:t>O</a:t>
             </a:r>
             <a:r>
               <a:rPr lang="en-US" sz="2400" b="1" dirty="0" smtClean="0">
@@ -7864,88 +10489,107 @@
               <a:t>ental </a:t>
             </a:r>
             <a:r>
-              <a:rPr lang="en-US" sz="2400" b="1" dirty="0" smtClean="0"/>
+              <a:rPr lang="en-US" sz="2400" b="1" dirty="0"/>
               <a:t>S</a:t>
             </a:r>
             <a:r>
-              <a:rPr lang="en-US" sz="2400" dirty="0" smtClean="0"/>
+              <a:rPr lang="en-US" sz="2400" dirty="0"/>
               <a:t>ystem</a:t>
             </a:r>
-            <a:r>
-              <a:rPr lang="en-US" sz="3600" dirty="0">
-                <a:solidFill>
-                  <a:srgbClr val="8CADAE">
-                    <a:shade val="75000"/>
-                  </a:srgbClr>
-                </a:solidFill>
-              </a:rPr>
+            <a:br>
+              <a:rPr lang="en-US" sz="2400" dirty="0"/>
+            </a:br>
+            <a:r>
+              <a:rPr lang="en-US" sz="3600" dirty="0"/>
               <a:t/>
             </a:r>
             <a:br>
-              <a:rPr lang="en-US" sz="3600" dirty="0">
-                <a:solidFill>
-                  <a:srgbClr val="8CADAE">
-                    <a:shade val="75000"/>
-                  </a:srgbClr>
-                </a:solidFill>
-              </a:rPr>
+              <a:rPr lang="en-US" sz="3600" dirty="0"/>
             </a:br>
             <a:r>
-              <a:rPr lang="en-US" sz="3600" dirty="0" smtClean="0"/>
-              <a:t/>
-            </a:r>
-            <a:br>
-              <a:rPr lang="en-US" sz="3600" dirty="0" smtClean="0"/>
-            </a:br>
-            <a:r>
-              <a:rPr lang="en-US" dirty="0" smtClean="0">
-                <a:solidFill>
-                  <a:srgbClr val="FF0000"/>
-                </a:solidFill>
-              </a:rPr>
-              <a:t>FRONT END</a:t>
-            </a:r>
-            <a:endParaRPr lang="en-US" dirty="0">
-              <a:solidFill>
-                <a:srgbClr val="FF0000"/>
-              </a:solidFill>
-            </a:endParaRPr>
-          </a:p>
-        </p:txBody>
-      </p:sp>
-      <p:sp>
-        <p:nvSpPr>
-          <p:cNvPr id="3" name="Content Placeholder 2"/>
-          <p:cNvSpPr>
-            <a:spLocks noGrp="1"/>
-          </p:cNvSpPr>
+              <a:rPr lang="en-US" dirty="0" smtClean="0"/>
+              <a:t>Contract – Data Requirements Specification</a:t>
+            </a:r>
+            <a:endParaRPr lang="en-US" dirty="0"/>
+          </a:p>
+        </p:txBody>
+      </p:sp>
+      <p:pic>
+        <p:nvPicPr>
+          <p:cNvPr id="5" name="Content Placeholder 4"/>
+          <p:cNvPicPr>
+            <a:picLocks noGrp="1" noChangeAspect="1"/>
+          </p:cNvPicPr>
           <p:nvPr>
             <p:ph sz="quarter" idx="1"/>
           </p:nvPr>
-        </p:nvSpPr>
-        <p:spPr>
-          <a:xfrm>
-            <a:off x="320040" y="1981200"/>
-            <a:ext cx="8503920" cy="4572000"/>
-          </a:xfrm>
-        </p:spPr>
-        <p:txBody>
-          <a:bodyPr/>
+        </p:nvPicPr>
+        <p:blipFill>
+          <a:blip r:embed="rId2"/>
+          <a:stretch>
+            <a:fillRect/>
+          </a:stretch>
+        </p:blipFill>
+        <p:spPr>
+          <a:xfrm>
+            <a:off x="304800" y="2653381"/>
+            <a:ext cx="3733800" cy="3928395"/>
+          </a:xfrm>
+          <a:prstGeom prst="rect">
+            <a:avLst/>
+          </a:prstGeom>
+        </p:spPr>
+      </p:pic>
+      <p:pic>
+        <p:nvPicPr>
+          <p:cNvPr id="6" name="Picture 5"/>
+          <p:cNvPicPr>
+            <a:picLocks noChangeAspect="1"/>
+          </p:cNvPicPr>
+          <p:nvPr/>
+        </p:nvPicPr>
+        <p:blipFill>
+          <a:blip r:embed="rId3"/>
+          <a:stretch>
+            <a:fillRect/>
+          </a:stretch>
+        </p:blipFill>
+        <p:spPr>
+          <a:xfrm>
+            <a:off x="4419600" y="1837347"/>
+            <a:ext cx="3733800" cy="4921309"/>
+          </a:xfrm>
+          <a:prstGeom prst="rect">
+            <a:avLst/>
+          </a:prstGeom>
+        </p:spPr>
+      </p:pic>
+      <p:sp>
+        <p:nvSpPr>
+          <p:cNvPr id="7" name="TextBox 6"/>
+          <p:cNvSpPr txBox="1"/>
+          <p:nvPr/>
+        </p:nvSpPr>
+        <p:spPr>
+          <a:xfrm>
+            <a:off x="304800" y="1837347"/>
+            <a:ext cx="3733800" cy="369332"/>
+          </a:xfrm>
+          <a:prstGeom prst="rect">
+            <a:avLst/>
+          </a:prstGeom>
+          <a:noFill/>
+        </p:spPr>
+        <p:txBody>
+          <a:bodyPr wrap="square" rtlCol="0">
+            <a:spAutoFit/>
+          </a:bodyPr>
           <a:lstStyle/>
           <a:p>
             <a:r>
               <a:rPr lang="en-US" dirty="0" smtClean="0"/>
-              <a:t>Added by VH;</a:t>
-            </a:r>
-            <a:endParaRPr lang="en-US" dirty="0"/>
-          </a:p>
-          <a:p>
-            <a:r>
-              <a:rPr lang="en-US" dirty="0"/>
-              <a:t>Please place these as dividers </a:t>
-            </a:r>
-          </a:p>
-          <a:p>
+              <a:t>Table 2 - Constraints</a:t>
+            </a:r>
             <a:endParaRPr lang="en-US" dirty="0"/>
           </a:p>
         </p:txBody>
@@ -7953,13 +10597,20 @@
     </p:spTree>
     <p:extLst>
       <p:ext uri="{BB962C8B-B14F-4D97-AF65-F5344CB8AC3E}">
-        <p14:creationId xmlns:p14="http://schemas.microsoft.com/office/powerpoint/2010/main" val="3428671890"/>
+        <p14:creationId xmlns:p14="http://schemas.microsoft.com/office/powerpoint/2010/main" val="1003792876"/>
       </p:ext>
     </p:extLst>
   </p:cSld>
   <p:clrMapOvr>
     <a:masterClrMapping/>
   </p:clrMapOvr>
+  <p:timing>
+    <p:tnLst>
+      <p:par>
+        <p:cTn id="1" dur="indefinite" restart="never" nodeType="tmRoot"/>
+      </p:par>
+    </p:tnLst>
+  </p:timing>
 </p:sld>
 </file>
 
@@ -7992,13 +10643,13 @@
         </p:nvSpPr>
         <p:spPr>
           <a:xfrm>
-            <a:off x="304800" y="0"/>
+            <a:off x="609600" y="-152400"/>
             <a:ext cx="8534400" cy="2054352"/>
           </a:xfrm>
         </p:spPr>
         <p:txBody>
           <a:bodyPr>
-            <a:normAutofit fontScale="90000"/>
+            <a:normAutofit/>
           </a:bodyPr>
           <a:lstStyle/>
           <a:p>
@@ -8070,30 +10721,30 @@
               <a:t>ental </a:t>
             </a:r>
             <a:r>
-              <a:rPr lang="en-US" sz="2400" b="1" dirty="0"/>
+              <a:rPr lang="en-US" sz="2400" b="1" dirty="0" smtClean="0"/>
               <a:t>S</a:t>
             </a:r>
             <a:r>
-              <a:rPr lang="en-US" sz="2400" dirty="0"/>
+              <a:rPr lang="en-US" sz="2400" dirty="0" smtClean="0"/>
               <a:t>ystem</a:t>
             </a:r>
+            <a:r>
+              <a:rPr lang="en-US" sz="2400" dirty="0"/>
+              <a:t/>
+            </a:r>
             <a:br>
               <a:rPr lang="en-US" sz="2400" dirty="0"/>
             </a:br>
             <a:r>
-              <a:rPr lang="en-US" sz="3600" dirty="0" smtClean="0"/>
+              <a:rPr lang="en-US" sz="2400" dirty="0"/>
               <a:t/>
             </a:r>
             <a:br>
-              <a:rPr lang="en-US" sz="3600" dirty="0" smtClean="0"/>
+              <a:rPr lang="en-US" sz="2400" dirty="0"/>
             </a:br>
             <a:r>
-              <a:rPr lang="en-US" sz="3600" dirty="0" smtClean="0"/>
-              <a:t>Business Modeling: </a:t>
-            </a:r>
-            <a:r>
               <a:rPr lang="en-US" dirty="0" smtClean="0"/>
-              <a:t>UML USE CASE Model</a:t>
+              <a:t>Data Design – Relational Model</a:t>
             </a:r>
             <a:endParaRPr lang="en-US" dirty="0"/>
           </a:p>
@@ -8111,7 +10762,7 @@
         </p:nvSpPr>
         <p:spPr>
           <a:xfrm>
-            <a:off x="320040" y="1981200"/>
+            <a:off x="320040" y="2261419"/>
             <a:ext cx="8503920" cy="4572000"/>
           </a:xfrm>
         </p:spPr>
@@ -8119,34 +10770,113 @@
           <a:bodyPr/>
           <a:lstStyle/>
           <a:p>
+            <a:pPr marL="0" indent="0">
+              <a:buNone/>
+            </a:pPr>
+            <a:endParaRPr lang="en-US" dirty="0" smtClean="0"/>
+          </a:p>
+          <a:p>
+            <a:pPr marL="0" indent="0">
+              <a:buNone/>
+            </a:pPr>
+            <a:r>
+              <a:rPr lang="en-US" dirty="0"/>
+              <a:t> </a:t>
+            </a:r>
             <a:r>
               <a:rPr lang="en-US" dirty="0" smtClean="0"/>
-              <a:t>Actors;</a:t>
-            </a:r>
-            <a:endParaRPr lang="en-US" dirty="0"/>
-          </a:p>
-          <a:p>
-            <a:r>
-              <a:rPr lang="en-US" dirty="0" smtClean="0"/>
-              <a:t>UML USE CASE Model</a:t>
-            </a:r>
-            <a:endParaRPr lang="en-US" dirty="0"/>
-          </a:p>
-          <a:p>
-            <a:endParaRPr lang="en-US" dirty="0"/>
+              <a:t>   </a:t>
+            </a:r>
+          </a:p>
+        </p:txBody>
+      </p:sp>
+      <p:pic>
+        <p:nvPicPr>
+          <p:cNvPr id="4" name="Picture 3"/>
+          <p:cNvPicPr>
+            <a:picLocks noChangeAspect="1"/>
+          </p:cNvPicPr>
+          <p:nvPr/>
+        </p:nvPicPr>
+        <p:blipFill>
+          <a:blip r:embed="rId2"/>
+          <a:stretch>
+            <a:fillRect/>
+          </a:stretch>
+        </p:blipFill>
+        <p:spPr>
+          <a:xfrm>
+            <a:off x="457200" y="1901952"/>
+            <a:ext cx="5496936" cy="1765213"/>
+          </a:xfrm>
+          <a:prstGeom prst="rect">
+            <a:avLst/>
+          </a:prstGeom>
+        </p:spPr>
+      </p:pic>
+      <p:sp>
+        <p:nvSpPr>
+          <p:cNvPr id="5" name="Oval 4"/>
+          <p:cNvSpPr/>
+          <p:nvPr/>
+        </p:nvSpPr>
+        <p:spPr>
+          <a:xfrm>
+            <a:off x="1371600" y="2819400"/>
+            <a:ext cx="1981200" cy="381000"/>
+          </a:xfrm>
+          <a:prstGeom prst="ellipse">
+            <a:avLst/>
+          </a:prstGeom>
+          <a:noFill/>
+          <a:ln>
+            <a:solidFill>
+              <a:srgbClr val="00B0F0"/>
+            </a:solidFill>
+          </a:ln>
+        </p:spPr>
+        <p:style>
+          <a:lnRef idx="2">
+            <a:schemeClr val="accent1">
+              <a:shade val="50000"/>
+            </a:schemeClr>
+          </a:lnRef>
+          <a:fillRef idx="1">
+            <a:schemeClr val="accent1"/>
+          </a:fillRef>
+          <a:effectRef idx="0">
+            <a:schemeClr val="accent1"/>
+          </a:effectRef>
+          <a:fontRef idx="minor">
+            <a:schemeClr val="lt1"/>
+          </a:fontRef>
+        </p:style>
+        <p:txBody>
+          <a:bodyPr rtlCol="0" anchor="ctr"/>
+          <a:lstStyle/>
+          <a:p>
+            <a:pPr algn="ctr"/>
+            <a:endParaRPr lang="en-US"/>
           </a:p>
         </p:txBody>
       </p:sp>
     </p:spTree>
     <p:extLst>
       <p:ext uri="{BB962C8B-B14F-4D97-AF65-F5344CB8AC3E}">
-        <p14:creationId xmlns:p14="http://schemas.microsoft.com/office/powerpoint/2010/main" val="3145259814"/>
+        <p14:creationId xmlns:p14="http://schemas.microsoft.com/office/powerpoint/2010/main" val="2876414311"/>
       </p:ext>
     </p:extLst>
   </p:cSld>
   <p:clrMapOvr>
     <a:masterClrMapping/>
   </p:clrMapOvr>
+  <p:timing>
+    <p:tnLst>
+      <p:par>
+        <p:cTn id="1" dur="indefinite" restart="never" nodeType="tmRoot"/>
+      </p:par>
+    </p:tnLst>
+  </p:timing>
 </p:sld>
 </file>
 
@@ -8179,22 +10909,22 @@
         </p:nvSpPr>
         <p:spPr>
           <a:xfrm>
-            <a:off x="304800" y="0"/>
+            <a:off x="609600" y="-152400"/>
             <a:ext cx="8534400" cy="2054352"/>
           </a:xfrm>
         </p:spPr>
         <p:txBody>
           <a:bodyPr>
-            <a:normAutofit fontScale="90000"/>
+            <a:normAutofit/>
           </a:bodyPr>
           <a:lstStyle/>
           <a:p>
             <a:r>
-              <a:rPr lang="en-US" sz="2800" b="1" dirty="0" smtClean="0"/>
+              <a:rPr lang="en-US" sz="2400" b="1" dirty="0" smtClean="0"/>
               <a:t>TEAM</a:t>
             </a:r>
             <a:r>
-              <a:rPr lang="en-US" sz="2800" b="1" dirty="0">
+              <a:rPr lang="en-US" sz="2400" b="1" dirty="0">
                 <a:solidFill>
                   <a:srgbClr val="FF0000"/>
                 </a:solidFill>
@@ -8202,11 +10932,11 @@
               <a:t>5</a:t>
             </a:r>
             <a:r>
-              <a:rPr lang="en-US" sz="2800" b="1" dirty="0" smtClean="0"/>
+              <a:rPr lang="en-US" sz="2400" b="1" dirty="0" smtClean="0"/>
               <a:t>O</a:t>
             </a:r>
             <a:r>
-              <a:rPr lang="en-US" sz="2800" b="1" dirty="0" smtClean="0">
+              <a:rPr lang="en-US" sz="2400" b="1" dirty="0" smtClean="0">
                 <a:solidFill>
                   <a:srgbClr val="FF0000"/>
                 </a:solidFill>
@@ -8214,26 +10944,26 @@
               <a:t>AR</a:t>
             </a:r>
             <a:r>
-              <a:rPr lang="en-US" sz="2800" b="1" dirty="0" smtClean="0"/>
+              <a:rPr lang="en-US" sz="2400" b="1" dirty="0" smtClean="0"/>
               <a:t>S</a:t>
             </a:r>
             <a:r>
-              <a:rPr lang="en-US" sz="2800" dirty="0"/>
+              <a:rPr lang="en-US" sz="2400" dirty="0"/>
               <a:t/>
             </a:r>
             <a:br>
-              <a:rPr lang="en-US" sz="2800" dirty="0"/>
+              <a:rPr lang="en-US" sz="2400" dirty="0"/>
             </a:br>
             <a:r>
-              <a:rPr lang="en-US" sz="2800" b="1" dirty="0"/>
+              <a:rPr lang="en-US" sz="2400" b="1" dirty="0"/>
               <a:t>O</a:t>
             </a:r>
             <a:r>
-              <a:rPr lang="en-US" sz="2800" dirty="0"/>
+              <a:rPr lang="en-US" sz="2400" dirty="0"/>
               <a:t>nline </a:t>
             </a:r>
             <a:r>
-              <a:rPr lang="en-US" sz="2800" b="1" dirty="0">
+              <a:rPr lang="en-US" sz="2400" b="1" dirty="0">
                 <a:solidFill>
                   <a:srgbClr val="FF0000"/>
                 </a:solidFill>
@@ -8241,11 +10971,11 @@
               <a:t>A</a:t>
             </a:r>
             <a:r>
-              <a:rPr lang="en-US" sz="2800" dirty="0"/>
+              <a:rPr lang="en-US" sz="2400" dirty="0"/>
               <a:t>partment </a:t>
             </a:r>
             <a:r>
-              <a:rPr lang="en-US" sz="2800" b="1" dirty="0">
+              <a:rPr lang="en-US" sz="2400" b="1" dirty="0">
                 <a:solidFill>
                   <a:srgbClr val="FF0000"/>
                 </a:solidFill>
@@ -8253,34 +10983,34 @@
               <a:t>R</a:t>
             </a:r>
             <a:r>
-              <a:rPr lang="en-US" sz="2800" dirty="0"/>
+              <a:rPr lang="en-US" sz="2400" dirty="0"/>
               <a:t>ental </a:t>
             </a:r>
             <a:r>
-              <a:rPr lang="en-US" sz="2800" b="1" dirty="0" smtClean="0"/>
+              <a:rPr lang="en-US" sz="2400" b="1" dirty="0" smtClean="0"/>
               <a:t>S</a:t>
             </a:r>
             <a:r>
-              <a:rPr lang="en-US" sz="2800" dirty="0" smtClean="0"/>
+              <a:rPr lang="en-US" sz="2400" dirty="0" smtClean="0"/>
               <a:t>ystem</a:t>
             </a:r>
+            <a:r>
+              <a:rPr lang="en-US" sz="2400" dirty="0"/>
+              <a:t/>
+            </a:r>
             <a:br>
-              <a:rPr lang="en-US" sz="2800" dirty="0" smtClean="0"/>
+              <a:rPr lang="en-US" sz="2400" dirty="0"/>
             </a:br>
             <a:r>
-              <a:rPr lang="en-US" sz="3600" dirty="0" smtClean="0"/>
+              <a:rPr lang="en-US" sz="2400" dirty="0"/>
               <a:t/>
             </a:r>
             <a:br>
-              <a:rPr lang="en-US" sz="3600" dirty="0" smtClean="0"/>
+              <a:rPr lang="en-US" sz="2400" dirty="0"/>
             </a:br>
             <a:r>
-              <a:rPr lang="en-US" sz="3600" dirty="0" smtClean="0"/>
-              <a:t>Contract: </a:t>
-            </a:r>
-            <a:r>
               <a:rPr lang="en-US" dirty="0" smtClean="0"/>
-              <a:t>Software Requirements Specification</a:t>
+              <a:t>Data Design – Relational Model</a:t>
             </a:r>
             <a:endParaRPr lang="en-US" dirty="0"/>
           </a:p>
@@ -8298,56 +11028,121 @@
         </p:nvSpPr>
         <p:spPr>
           <a:xfrm>
-            <a:off x="-76200" y="1981200"/>
-            <a:ext cx="9220200" cy="4572000"/>
+            <a:off x="320040" y="2261419"/>
+            <a:ext cx="8503920" cy="4572000"/>
           </a:xfrm>
         </p:spPr>
         <p:txBody>
           <a:bodyPr/>
           <a:lstStyle/>
           <a:p>
+            <a:pPr marL="0" indent="0">
+              <a:buNone/>
+            </a:pPr>
+            <a:endParaRPr lang="en-US" dirty="0" smtClean="0"/>
+          </a:p>
+          <a:p>
+            <a:pPr marL="0" indent="0">
+              <a:buNone/>
+            </a:pPr>
+            <a:r>
+              <a:rPr lang="en-US" dirty="0"/>
+              <a:t> </a:t>
+            </a:r>
             <a:r>
               <a:rPr lang="en-US" dirty="0" smtClean="0"/>
-              <a:t>Summary of </a:t>
-            </a:r>
-            <a:r>
-              <a:rPr lang="en-US" dirty="0" err="1" smtClean="0"/>
-              <a:t>Ucs</a:t>
-            </a:r>
-            <a:r>
-              <a:rPr lang="en-US" dirty="0" smtClean="0"/>
-              <a:t>;</a:t>
-            </a:r>
-          </a:p>
-          <a:p>
-            <a:r>
-              <a:rPr lang="en-US" dirty="0" smtClean="0"/>
-              <a:t>Table 3.2 Functional &amp; Non-Functional Requirements;</a:t>
-            </a:r>
-            <a:endParaRPr lang="en-US" dirty="0"/>
-          </a:p>
-          <a:p>
-            <a:r>
-              <a:rPr lang="en-US" dirty="0" smtClean="0"/>
-              <a:t>Appendix with Actors and UML USE CASE Diagram.</a:t>
-            </a:r>
-            <a:endParaRPr lang="en-US" dirty="0"/>
-          </a:p>
-          <a:p>
-            <a:endParaRPr lang="en-US" dirty="0"/>
+              <a:t>   </a:t>
+            </a:r>
+          </a:p>
+        </p:txBody>
+      </p:sp>
+      <p:pic>
+        <p:nvPicPr>
+          <p:cNvPr id="6" name="Picture 5"/>
+          <p:cNvPicPr>
+            <a:picLocks noChangeAspect="1"/>
+          </p:cNvPicPr>
+          <p:nvPr/>
+        </p:nvPicPr>
+        <p:blipFill>
+          <a:blip r:embed="rId2"/>
+          <a:stretch>
+            <a:fillRect/>
+          </a:stretch>
+        </p:blipFill>
+        <p:spPr>
+          <a:xfrm>
+            <a:off x="400050" y="1828800"/>
+            <a:ext cx="4171950" cy="4488807"/>
+          </a:xfrm>
+          <a:prstGeom prst="rect">
+            <a:avLst/>
+          </a:prstGeom>
+        </p:spPr>
+      </p:pic>
+      <p:sp>
+        <p:nvSpPr>
+          <p:cNvPr id="5" name="Oval 4"/>
+          <p:cNvSpPr/>
+          <p:nvPr/>
+        </p:nvSpPr>
+        <p:spPr>
+          <a:xfrm rot="1567006">
+            <a:off x="1727643" y="3160181"/>
+            <a:ext cx="1098363" cy="1973847"/>
+          </a:xfrm>
+          <a:prstGeom prst="ellipse">
+            <a:avLst/>
+          </a:prstGeom>
+          <a:noFill/>
+          <a:ln>
+            <a:solidFill>
+              <a:srgbClr val="00B0F0"/>
+            </a:solidFill>
+          </a:ln>
+        </p:spPr>
+        <p:style>
+          <a:lnRef idx="2">
+            <a:schemeClr val="accent1">
+              <a:shade val="50000"/>
+            </a:schemeClr>
+          </a:lnRef>
+          <a:fillRef idx="1">
+            <a:schemeClr val="accent1"/>
+          </a:fillRef>
+          <a:effectRef idx="0">
+            <a:schemeClr val="accent1"/>
+          </a:effectRef>
+          <a:fontRef idx="minor">
+            <a:schemeClr val="lt1"/>
+          </a:fontRef>
+        </p:style>
+        <p:txBody>
+          <a:bodyPr rtlCol="0" anchor="ctr"/>
+          <a:lstStyle/>
+          <a:p>
+            <a:pPr algn="ctr"/>
+            <a:endParaRPr lang="en-US"/>
           </a:p>
         </p:txBody>
       </p:sp>
     </p:spTree>
     <p:extLst>
       <p:ext uri="{BB962C8B-B14F-4D97-AF65-F5344CB8AC3E}">
-        <p14:creationId xmlns:p14="http://schemas.microsoft.com/office/powerpoint/2010/main" val="3552573354"/>
+        <p14:creationId xmlns:p14="http://schemas.microsoft.com/office/powerpoint/2010/main" val="1912827510"/>
       </p:ext>
     </p:extLst>
   </p:cSld>
   <p:clrMapOvr>
     <a:masterClrMapping/>
   </p:clrMapOvr>
+  <p:timing>
+    <p:tnLst>
+      <p:par>
+        <p:cTn id="1" dur="indefinite" restart="never" nodeType="tmRoot"/>
+      </p:par>
+    </p:tnLst>
+  </p:timing>
 </p:sld>
 </file>
 
@@ -8391,11 +11186,11 @@
           <a:lstStyle/>
           <a:p>
             <a:r>
-              <a:rPr lang="en-US" sz="2800" b="1" dirty="0" smtClean="0"/>
+              <a:rPr lang="en-US" sz="2400" b="1" dirty="0" smtClean="0"/>
               <a:t>TEAM</a:t>
             </a:r>
             <a:r>
-              <a:rPr lang="en-US" sz="2800" b="1" dirty="0">
+              <a:rPr lang="en-US" sz="2400" b="1" dirty="0">
                 <a:solidFill>
                   <a:srgbClr val="FF0000"/>
                 </a:solidFill>
@@ -8403,11 +11198,11 @@
               <a:t>5</a:t>
             </a:r>
             <a:r>
-              <a:rPr lang="en-US" sz="2800" b="1" dirty="0" smtClean="0"/>
+              <a:rPr lang="en-US" sz="2400" b="1" dirty="0" smtClean="0"/>
               <a:t>O</a:t>
             </a:r>
             <a:r>
-              <a:rPr lang="en-US" sz="2800" b="1" dirty="0" smtClean="0">
+              <a:rPr lang="en-US" sz="2400" b="1" dirty="0" smtClean="0">
                 <a:solidFill>
                   <a:srgbClr val="FF0000"/>
                 </a:solidFill>
@@ -8415,26 +11210,26 @@
               <a:t>AR</a:t>
             </a:r>
             <a:r>
-              <a:rPr lang="en-US" sz="2800" b="1" dirty="0" smtClean="0"/>
+              <a:rPr lang="en-US" sz="2400" b="1" dirty="0" smtClean="0"/>
               <a:t>S</a:t>
             </a:r>
             <a:r>
-              <a:rPr lang="en-US" sz="2800" dirty="0"/>
+              <a:rPr lang="en-US" sz="2400" dirty="0"/>
               <a:t/>
             </a:r>
             <a:br>
-              <a:rPr lang="en-US" sz="2800" dirty="0"/>
+              <a:rPr lang="en-US" sz="2400" dirty="0"/>
             </a:br>
             <a:r>
-              <a:rPr lang="en-US" sz="2800" b="1" dirty="0"/>
+              <a:rPr lang="en-US" sz="2400" b="1" dirty="0"/>
               <a:t>O</a:t>
             </a:r>
             <a:r>
-              <a:rPr lang="en-US" sz="2800" dirty="0"/>
+              <a:rPr lang="en-US" sz="2400" dirty="0"/>
               <a:t>nline </a:t>
             </a:r>
             <a:r>
-              <a:rPr lang="en-US" sz="2800" b="1" dirty="0">
+              <a:rPr lang="en-US" sz="2400" b="1" dirty="0">
                 <a:solidFill>
                   <a:srgbClr val="FF0000"/>
                 </a:solidFill>
@@ -8442,11 +11237,11 @@
               <a:t>A</a:t>
             </a:r>
             <a:r>
-              <a:rPr lang="en-US" sz="2800" dirty="0"/>
+              <a:rPr lang="en-US" sz="2400" dirty="0"/>
               <a:t>partment </a:t>
             </a:r>
             <a:r>
-              <a:rPr lang="en-US" sz="2800" b="1" dirty="0">
+              <a:rPr lang="en-US" sz="2400" b="1" dirty="0">
                 <a:solidFill>
                   <a:srgbClr val="FF0000"/>
                 </a:solidFill>
@@ -8454,34 +11249,34 @@
               <a:t>R</a:t>
             </a:r>
             <a:r>
-              <a:rPr lang="en-US" sz="2800" dirty="0"/>
+              <a:rPr lang="en-US" sz="2400" dirty="0"/>
               <a:t>ental </a:t>
             </a:r>
             <a:r>
-              <a:rPr lang="en-US" sz="2800" b="1" dirty="0"/>
+              <a:rPr lang="en-US" sz="2400" b="1" dirty="0" smtClean="0"/>
               <a:t>S</a:t>
             </a:r>
             <a:r>
-              <a:rPr lang="en-US" sz="2800" dirty="0"/>
-              <a:t>ystem </a:t>
-            </a:r>
-            <a:r>
-              <a:rPr lang="en-US" sz="2800" dirty="0" smtClean="0"/>
+              <a:rPr lang="en-US" sz="2400" dirty="0" smtClean="0"/>
+              <a:t>ystem</a:t>
+            </a:r>
+            <a:r>
+              <a:rPr lang="en-US" sz="2400" dirty="0"/>
               <a:t/>
             </a:r>
             <a:br>
-              <a:rPr lang="en-US" sz="2800" dirty="0" smtClean="0"/>
+              <a:rPr lang="en-US" sz="2400" dirty="0"/>
             </a:br>
             <a:r>
-              <a:rPr lang="en-US" sz="2800" dirty="0" smtClean="0"/>
+              <a:rPr lang="en-US" sz="2400" dirty="0"/>
               <a:t/>
             </a:r>
             <a:br>
-              <a:rPr lang="en-US" sz="2800" dirty="0" smtClean="0"/>
+              <a:rPr lang="en-US" sz="2400" dirty="0"/>
             </a:br>
             <a:r>
               <a:rPr lang="en-US" dirty="0" smtClean="0"/>
-              <a:t>Software Project Management Plan</a:t>
+              <a:t>Data Design – Relational Model</a:t>
             </a:r>
             <a:endParaRPr lang="en-US" dirty="0"/>
           </a:p>
@@ -8499,37 +11294,121 @@
         </p:nvSpPr>
         <p:spPr>
           <a:xfrm>
-            <a:off x="-76200" y="1981200"/>
-            <a:ext cx="9220200" cy="4572000"/>
+            <a:off x="320040" y="2261419"/>
+            <a:ext cx="8503920" cy="4572000"/>
           </a:xfrm>
         </p:spPr>
         <p:txBody>
           <a:bodyPr/>
           <a:lstStyle/>
-          <a:p>
-            <a:r>
-              <a:rPr lang="en-US" dirty="0" smtClean="0"/>
-              <a:t>COCOMO II Estimates, screenshot of the CASE TOOL;</a:t>
-            </a:r>
-          </a:p>
           <a:p>
             <a:pPr marL="0" indent="0">
               <a:buNone/>
             </a:pPr>
-            <a:endParaRPr lang="en-US" dirty="0"/>
+            <a:endParaRPr lang="en-US" dirty="0" smtClean="0"/>
+          </a:p>
+          <a:p>
+            <a:pPr marL="0" indent="0">
+              <a:buNone/>
+            </a:pPr>
+            <a:r>
+              <a:rPr lang="en-US" dirty="0"/>
+              <a:t> </a:t>
+            </a:r>
+            <a:r>
+              <a:rPr lang="en-US" dirty="0" smtClean="0"/>
+              <a:t>   </a:t>
+            </a:r>
+          </a:p>
+        </p:txBody>
+      </p:sp>
+      <p:pic>
+        <p:nvPicPr>
+          <p:cNvPr id="6" name="Picture 5"/>
+          <p:cNvPicPr>
+            <a:picLocks noChangeAspect="1"/>
+          </p:cNvPicPr>
+          <p:nvPr/>
+        </p:nvPicPr>
+        <p:blipFill>
+          <a:blip r:embed="rId2"/>
+          <a:stretch>
+            <a:fillRect/>
+          </a:stretch>
+        </p:blipFill>
+        <p:spPr>
+          <a:xfrm>
+            <a:off x="152400" y="2133600"/>
+            <a:ext cx="4419600" cy="3324256"/>
+          </a:xfrm>
+          <a:prstGeom prst="rect">
+            <a:avLst/>
+          </a:prstGeom>
+        </p:spPr>
+      </p:pic>
+      <p:sp>
+        <p:nvSpPr>
+          <p:cNvPr id="5" name="Oval 4"/>
+          <p:cNvSpPr/>
+          <p:nvPr/>
+        </p:nvSpPr>
+        <p:spPr>
+          <a:xfrm rot="2505232">
+            <a:off x="999191" y="2585266"/>
+            <a:ext cx="1971033" cy="579463"/>
+          </a:xfrm>
+          <a:prstGeom prst="ellipse">
+            <a:avLst/>
+          </a:prstGeom>
+          <a:noFill/>
+          <a:ln>
+            <a:solidFill>
+              <a:srgbClr val="00B0F0"/>
+            </a:solidFill>
+          </a:ln>
+        </p:spPr>
+        <p:style>
+          <a:lnRef idx="2">
+            <a:schemeClr val="accent1">
+              <a:shade val="50000"/>
+            </a:schemeClr>
+          </a:lnRef>
+          <a:fillRef idx="1">
+            <a:schemeClr val="accent1"/>
+          </a:fillRef>
+          <a:effectRef idx="0">
+            <a:schemeClr val="accent1"/>
+          </a:effectRef>
+          <a:fontRef idx="minor">
+            <a:schemeClr val="lt1"/>
+          </a:fontRef>
+        </p:style>
+        <p:txBody>
+          <a:bodyPr rtlCol="0" anchor="ctr"/>
+          <a:lstStyle/>
+          <a:p>
+            <a:pPr algn="ctr"/>
+            <a:endParaRPr lang="en-US"/>
           </a:p>
         </p:txBody>
       </p:sp>
     </p:spTree>
     <p:extLst>
       <p:ext uri="{BB962C8B-B14F-4D97-AF65-F5344CB8AC3E}">
-        <p14:creationId xmlns:p14="http://schemas.microsoft.com/office/powerpoint/2010/main" val="1863565787"/>
+        <p14:creationId xmlns:p14="http://schemas.microsoft.com/office/powerpoint/2010/main" val="1423670454"/>
       </p:ext>
     </p:extLst>
   </p:cSld>
   <p:clrMapOvr>
     <a:masterClrMapping/>
   </p:clrMapOvr>
+  <p:timing>
+    <p:tnLst>
+      <p:par>
+        <p:cTn id="1" dur="indefinite" restart="never" nodeType="tmRoot"/>
+      </p:par>
+    </p:tnLst>
+  </p:timing>
 </p:sld>
 </file>
 

</xml_diff>

<commit_message>
Added Create Tables to the power point
</commit_message>
<xml_diff>
--- a/TEAM PROJECT DELIVERABLES/TEAM5OARS.pptx
+++ b/TEAM PROJECT DELIVERABLES/TEAM5OARS.pptx
@@ -130,7 +130,7 @@
   </p:defaultTextStyle>
   <p:extLst>
     <p:ext uri="{EFAFB233-063F-42B5-8137-9DF3F51BA10A}">
-      <p15:sldGuideLst xmlns:p15="http://schemas.microsoft.com/office/powerpoint/2012/main">
+      <p15:sldGuideLst xmlns="" xmlns:p15="http://schemas.microsoft.com/office/powerpoint/2012/main">
         <p15:guide id="1" orient="horz" pos="2160">
           <p15:clr>
             <a:srgbClr val="A4A3A4"/>
@@ -6729,6 +6729,60 @@
           </a:p>
         </p:txBody>
       </p:sp>
+      <p:pic>
+        <p:nvPicPr>
+          <p:cNvPr id="7" name="Picture 2"/>
+          <p:cNvPicPr>
+            <a:picLocks noChangeAspect="1" noChangeArrowheads="1"/>
+          </p:cNvPicPr>
+          <p:nvPr/>
+        </p:nvPicPr>
+        <p:blipFill>
+          <a:blip r:embed="rId3">
+            <a:extLst>
+              <a:ext uri="{28A0092B-C50C-407E-A947-70E740481C1C}">
+                <a14:useLocalDpi xmlns:a14="http://schemas.microsoft.com/office/drawing/2010/main" val="0"/>
+              </a:ext>
+            </a:extLst>
+          </a:blip>
+          <a:srcRect/>
+          <a:stretch>
+            <a:fillRect/>
+          </a:stretch>
+        </p:blipFill>
+        <p:spPr bwMode="auto">
+          <a:xfrm>
+            <a:off x="4679402" y="2025328"/>
+            <a:ext cx="4235998" cy="3994472"/>
+          </a:xfrm>
+          <a:prstGeom prst="rect">
+            <a:avLst/>
+          </a:prstGeom>
+          <a:noFill/>
+          <a:ln>
+            <a:noFill/>
+          </a:ln>
+          <a:extLst>
+            <a:ext uri="{909E8E84-426E-40DD-AFC4-6F175D3DCCD1}">
+              <a14:hiddenFill xmlns:a14="http://schemas.microsoft.com/office/drawing/2010/main">
+                <a:solidFill>
+                  <a:schemeClr val="accent1"/>
+                </a:solidFill>
+              </a14:hiddenFill>
+            </a:ext>
+            <a:ext uri="{91240B29-F687-4F45-9708-019B960494DF}">
+              <a14:hiddenLine xmlns:a14="http://schemas.microsoft.com/office/drawing/2010/main" w="9525">
+                <a:solidFill>
+                  <a:schemeClr val="tx1"/>
+                </a:solidFill>
+                <a:miter lim="800000"/>
+                <a:headEnd/>
+                <a:tailEnd/>
+              </a14:hiddenLine>
+            </a:ext>
+          </a:extLst>
+        </p:spPr>
+      </p:pic>
     </p:spTree>
     <p:extLst>
       <p:ext uri="{BB962C8B-B14F-4D97-AF65-F5344CB8AC3E}">
@@ -6995,6 +7049,60 @@
           </a:p>
         </p:txBody>
       </p:sp>
+      <p:pic>
+        <p:nvPicPr>
+          <p:cNvPr id="6" name="Picture 2"/>
+          <p:cNvPicPr>
+            <a:picLocks noChangeAspect="1" noChangeArrowheads="1"/>
+          </p:cNvPicPr>
+          <p:nvPr/>
+        </p:nvPicPr>
+        <p:blipFill>
+          <a:blip r:embed="rId3">
+            <a:extLst>
+              <a:ext uri="{28A0092B-C50C-407E-A947-70E740481C1C}">
+                <a14:useLocalDpi xmlns:a14="http://schemas.microsoft.com/office/drawing/2010/main" val="0"/>
+              </a:ext>
+            </a:extLst>
+          </a:blip>
+          <a:srcRect/>
+          <a:stretch>
+            <a:fillRect/>
+          </a:stretch>
+        </p:blipFill>
+        <p:spPr bwMode="auto">
+          <a:xfrm>
+            <a:off x="4679402" y="2025328"/>
+            <a:ext cx="4235998" cy="3994472"/>
+          </a:xfrm>
+          <a:prstGeom prst="rect">
+            <a:avLst/>
+          </a:prstGeom>
+          <a:noFill/>
+          <a:ln>
+            <a:noFill/>
+          </a:ln>
+          <a:extLst>
+            <a:ext uri="{909E8E84-426E-40DD-AFC4-6F175D3DCCD1}">
+              <a14:hiddenFill xmlns:a14="http://schemas.microsoft.com/office/drawing/2010/main">
+                <a:solidFill>
+                  <a:schemeClr val="accent1"/>
+                </a:solidFill>
+              </a14:hiddenFill>
+            </a:ext>
+            <a:ext uri="{91240B29-F687-4F45-9708-019B960494DF}">
+              <a14:hiddenLine xmlns:a14="http://schemas.microsoft.com/office/drawing/2010/main" w="9525">
+                <a:solidFill>
+                  <a:schemeClr val="tx1"/>
+                </a:solidFill>
+                <a:miter lim="800000"/>
+                <a:headEnd/>
+                <a:tailEnd/>
+              </a14:hiddenLine>
+            </a:ext>
+          </a:extLst>
+        </p:spPr>
+      </p:pic>
     </p:spTree>
     <p:extLst>
       <p:ext uri="{BB962C8B-B14F-4D97-AF65-F5344CB8AC3E}">
@@ -7261,6 +7369,60 @@
           </a:p>
         </p:txBody>
       </p:sp>
+      <p:pic>
+        <p:nvPicPr>
+          <p:cNvPr id="8" name="Picture 2"/>
+          <p:cNvPicPr>
+            <a:picLocks noChangeAspect="1" noChangeArrowheads="1"/>
+          </p:cNvPicPr>
+          <p:nvPr/>
+        </p:nvPicPr>
+        <p:blipFill>
+          <a:blip r:embed="rId3">
+            <a:extLst>
+              <a:ext uri="{28A0092B-C50C-407E-A947-70E740481C1C}">
+                <a14:useLocalDpi xmlns:a14="http://schemas.microsoft.com/office/drawing/2010/main" val="0"/>
+              </a:ext>
+            </a:extLst>
+          </a:blip>
+          <a:srcRect/>
+          <a:stretch>
+            <a:fillRect/>
+          </a:stretch>
+        </p:blipFill>
+        <p:spPr bwMode="auto">
+          <a:xfrm>
+            <a:off x="4419600" y="2076880"/>
+            <a:ext cx="4235998" cy="3994472"/>
+          </a:xfrm>
+          <a:prstGeom prst="rect">
+            <a:avLst/>
+          </a:prstGeom>
+          <a:noFill/>
+          <a:ln>
+            <a:noFill/>
+          </a:ln>
+          <a:extLst>
+            <a:ext uri="{909E8E84-426E-40DD-AFC4-6F175D3DCCD1}">
+              <a14:hiddenFill xmlns:a14="http://schemas.microsoft.com/office/drawing/2010/main">
+                <a:solidFill>
+                  <a:schemeClr val="accent1"/>
+                </a:solidFill>
+              </a14:hiddenFill>
+            </a:ext>
+            <a:ext uri="{91240B29-F687-4F45-9708-019B960494DF}">
+              <a14:hiddenLine xmlns:a14="http://schemas.microsoft.com/office/drawing/2010/main" w="9525">
+                <a:solidFill>
+                  <a:schemeClr val="tx1"/>
+                </a:solidFill>
+                <a:miter lim="800000"/>
+                <a:headEnd/>
+                <a:tailEnd/>
+              </a14:hiddenLine>
+            </a:ext>
+          </a:extLst>
+        </p:spPr>
+      </p:pic>
     </p:spTree>
     <p:extLst>
       <p:ext uri="{BB962C8B-B14F-4D97-AF65-F5344CB8AC3E}">
@@ -7527,6 +7689,60 @@
           </a:p>
         </p:txBody>
       </p:sp>
+      <p:pic>
+        <p:nvPicPr>
+          <p:cNvPr id="7" name="Picture 2"/>
+          <p:cNvPicPr>
+            <a:picLocks noChangeAspect="1" noChangeArrowheads="1"/>
+          </p:cNvPicPr>
+          <p:nvPr/>
+        </p:nvPicPr>
+        <p:blipFill>
+          <a:blip r:embed="rId3">
+            <a:extLst>
+              <a:ext uri="{28A0092B-C50C-407E-A947-70E740481C1C}">
+                <a14:useLocalDpi xmlns:a14="http://schemas.microsoft.com/office/drawing/2010/main" val="0"/>
+              </a:ext>
+            </a:extLst>
+          </a:blip>
+          <a:srcRect/>
+          <a:stretch>
+            <a:fillRect/>
+          </a:stretch>
+        </p:blipFill>
+        <p:spPr bwMode="auto">
+          <a:xfrm>
+            <a:off x="4572000" y="2025328"/>
+            <a:ext cx="4235998" cy="3994472"/>
+          </a:xfrm>
+          <a:prstGeom prst="rect">
+            <a:avLst/>
+          </a:prstGeom>
+          <a:noFill/>
+          <a:ln>
+            <a:noFill/>
+          </a:ln>
+          <a:extLst>
+            <a:ext uri="{909E8E84-426E-40DD-AFC4-6F175D3DCCD1}">
+              <a14:hiddenFill xmlns:a14="http://schemas.microsoft.com/office/drawing/2010/main">
+                <a:solidFill>
+                  <a:schemeClr val="accent1"/>
+                </a:solidFill>
+              </a14:hiddenFill>
+            </a:ext>
+            <a:ext uri="{91240B29-F687-4F45-9708-019B960494DF}">
+              <a14:hiddenLine xmlns:a14="http://schemas.microsoft.com/office/drawing/2010/main" w="9525">
+                <a:solidFill>
+                  <a:schemeClr val="tx1"/>
+                </a:solidFill>
+                <a:miter lim="800000"/>
+                <a:headEnd/>
+                <a:tailEnd/>
+              </a14:hiddenLine>
+            </a:ext>
+          </a:extLst>
+        </p:spPr>
+      </p:pic>
     </p:spTree>
     <p:extLst>
       <p:ext uri="{BB962C8B-B14F-4D97-AF65-F5344CB8AC3E}">
@@ -7793,6 +8009,60 @@
           </a:p>
         </p:txBody>
       </p:sp>
+      <p:pic>
+        <p:nvPicPr>
+          <p:cNvPr id="7" name="Picture 2"/>
+          <p:cNvPicPr>
+            <a:picLocks noChangeAspect="1" noChangeArrowheads="1"/>
+          </p:cNvPicPr>
+          <p:nvPr/>
+        </p:nvPicPr>
+        <p:blipFill>
+          <a:blip r:embed="rId3">
+            <a:extLst>
+              <a:ext uri="{28A0092B-C50C-407E-A947-70E740481C1C}">
+                <a14:useLocalDpi xmlns:a14="http://schemas.microsoft.com/office/drawing/2010/main" val="0"/>
+              </a:ext>
+            </a:extLst>
+          </a:blip>
+          <a:srcRect/>
+          <a:stretch>
+            <a:fillRect/>
+          </a:stretch>
+        </p:blipFill>
+        <p:spPr bwMode="auto">
+          <a:xfrm>
+            <a:off x="4419600" y="2025328"/>
+            <a:ext cx="4235998" cy="3994472"/>
+          </a:xfrm>
+          <a:prstGeom prst="rect">
+            <a:avLst/>
+          </a:prstGeom>
+          <a:noFill/>
+          <a:ln>
+            <a:noFill/>
+          </a:ln>
+          <a:extLst>
+            <a:ext uri="{909E8E84-426E-40DD-AFC4-6F175D3DCCD1}">
+              <a14:hiddenFill xmlns:a14="http://schemas.microsoft.com/office/drawing/2010/main">
+                <a:solidFill>
+                  <a:schemeClr val="accent1"/>
+                </a:solidFill>
+              </a14:hiddenFill>
+            </a:ext>
+            <a:ext uri="{91240B29-F687-4F45-9708-019B960494DF}">
+              <a14:hiddenLine xmlns:a14="http://schemas.microsoft.com/office/drawing/2010/main" w="9525">
+                <a:solidFill>
+                  <a:schemeClr val="tx1"/>
+                </a:solidFill>
+                <a:miter lim="800000"/>
+                <a:headEnd/>
+                <a:tailEnd/>
+              </a14:hiddenLine>
+            </a:ext>
+          </a:extLst>
+        </p:spPr>
+      </p:pic>
     </p:spTree>
     <p:extLst>
       <p:ext uri="{BB962C8B-B14F-4D97-AF65-F5344CB8AC3E}">
@@ -8059,6 +8329,60 @@
           </a:p>
         </p:txBody>
       </p:sp>
+      <p:pic>
+        <p:nvPicPr>
+          <p:cNvPr id="7" name="Picture 2"/>
+          <p:cNvPicPr>
+            <a:picLocks noChangeAspect="1" noChangeArrowheads="1"/>
+          </p:cNvPicPr>
+          <p:nvPr/>
+        </p:nvPicPr>
+        <p:blipFill>
+          <a:blip r:embed="rId3">
+            <a:extLst>
+              <a:ext uri="{28A0092B-C50C-407E-A947-70E740481C1C}">
+                <a14:useLocalDpi xmlns:a14="http://schemas.microsoft.com/office/drawing/2010/main" val="0"/>
+              </a:ext>
+            </a:extLst>
+          </a:blip>
+          <a:srcRect/>
+          <a:stretch>
+            <a:fillRect/>
+          </a:stretch>
+        </p:blipFill>
+        <p:spPr bwMode="auto">
+          <a:xfrm>
+            <a:off x="4267200" y="3352800"/>
+            <a:ext cx="4343400" cy="2419350"/>
+          </a:xfrm>
+          <a:prstGeom prst="rect">
+            <a:avLst/>
+          </a:prstGeom>
+          <a:noFill/>
+          <a:ln>
+            <a:noFill/>
+          </a:ln>
+          <a:extLst>
+            <a:ext uri="{909E8E84-426E-40DD-AFC4-6F175D3DCCD1}">
+              <a14:hiddenFill xmlns:a14="http://schemas.microsoft.com/office/drawing/2010/main">
+                <a:solidFill>
+                  <a:schemeClr val="accent1"/>
+                </a:solidFill>
+              </a14:hiddenFill>
+            </a:ext>
+            <a:ext uri="{91240B29-F687-4F45-9708-019B960494DF}">
+              <a14:hiddenLine xmlns:a14="http://schemas.microsoft.com/office/drawing/2010/main" w="9525">
+                <a:solidFill>
+                  <a:schemeClr val="tx1"/>
+                </a:solidFill>
+                <a:miter lim="800000"/>
+                <a:headEnd/>
+                <a:tailEnd/>
+              </a14:hiddenLine>
+            </a:ext>
+          </a:extLst>
+        </p:spPr>
+      </p:pic>
     </p:spTree>
     <p:extLst>
       <p:ext uri="{BB962C8B-B14F-4D97-AF65-F5344CB8AC3E}">
@@ -8232,7 +8556,9 @@
           </a:xfrm>
         </p:spPr>
         <p:txBody>
-          <a:bodyPr/>
+          <a:bodyPr>
+            <a:normAutofit lnSpcReduction="10000"/>
+          </a:bodyPr>
           <a:lstStyle/>
           <a:p>
             <a:r>
@@ -8279,7 +8605,32 @@
             <a:pPr marL="0" indent="0">
               <a:buNone/>
             </a:pPr>
-            <a:endParaRPr lang="en-US" dirty="0"/>
+            <a:r>
+              <a:rPr lang="en-US" dirty="0" smtClean="0">
+                <a:solidFill>
+                  <a:srgbClr val="FF0000"/>
+                </a:solidFill>
+              </a:rPr>
+              <a:t>SOMEONE DELETE THIS</a:t>
+            </a:r>
+          </a:p>
+          <a:p>
+            <a:pPr marL="0" indent="0">
+              <a:buNone/>
+            </a:pPr>
+            <a:r>
+              <a:rPr lang="en-US" dirty="0" smtClean="0">
+                <a:solidFill>
+                  <a:srgbClr val="FF0000"/>
+                </a:solidFill>
+              </a:rPr>
+              <a:t> SLIDE</a:t>
+            </a:r>
+            <a:endParaRPr lang="en-US" dirty="0">
+              <a:solidFill>
+                <a:srgbClr val="FF0000"/>
+              </a:solidFill>
+            </a:endParaRPr>
           </a:p>
           <a:p>
             <a:pPr marL="0" indent="0">
@@ -10860,6 +11211,60 @@
           </a:p>
         </p:txBody>
       </p:sp>
+      <p:pic>
+        <p:nvPicPr>
+          <p:cNvPr id="6" name="Picture 2"/>
+          <p:cNvPicPr>
+            <a:picLocks noChangeAspect="1" noChangeArrowheads="1"/>
+          </p:cNvPicPr>
+          <p:nvPr/>
+        </p:nvPicPr>
+        <p:blipFill>
+          <a:blip r:embed="rId3">
+            <a:extLst>
+              <a:ext uri="{28A0092B-C50C-407E-A947-70E740481C1C}">
+                <a14:useLocalDpi xmlns:a14="http://schemas.microsoft.com/office/drawing/2010/main" val="0"/>
+              </a:ext>
+            </a:extLst>
+          </a:blip>
+          <a:srcRect/>
+          <a:stretch>
+            <a:fillRect/>
+          </a:stretch>
+        </p:blipFill>
+        <p:spPr bwMode="auto">
+          <a:xfrm>
+            <a:off x="4191000" y="3810000"/>
+            <a:ext cx="4343400" cy="2419350"/>
+          </a:xfrm>
+          <a:prstGeom prst="rect">
+            <a:avLst/>
+          </a:prstGeom>
+          <a:noFill/>
+          <a:ln>
+            <a:noFill/>
+          </a:ln>
+          <a:extLst>
+            <a:ext uri="{909E8E84-426E-40DD-AFC4-6F175D3DCCD1}">
+              <a14:hiddenFill xmlns:a14="http://schemas.microsoft.com/office/drawing/2010/main">
+                <a:solidFill>
+                  <a:schemeClr val="accent1"/>
+                </a:solidFill>
+              </a14:hiddenFill>
+            </a:ext>
+            <a:ext uri="{91240B29-F687-4F45-9708-019B960494DF}">
+              <a14:hiddenLine xmlns:a14="http://schemas.microsoft.com/office/drawing/2010/main" w="9525">
+                <a:solidFill>
+                  <a:schemeClr val="tx1"/>
+                </a:solidFill>
+                <a:miter lim="800000"/>
+                <a:headEnd/>
+                <a:tailEnd/>
+              </a14:hiddenLine>
+            </a:ext>
+          </a:extLst>
+        </p:spPr>
+      </p:pic>
     </p:spTree>
     <p:extLst>
       <p:ext uri="{BB962C8B-B14F-4D97-AF65-F5344CB8AC3E}">
@@ -11126,6 +11531,60 @@
           </a:p>
         </p:txBody>
       </p:sp>
+      <p:pic>
+        <p:nvPicPr>
+          <p:cNvPr id="7" name="Picture 2"/>
+          <p:cNvPicPr>
+            <a:picLocks noChangeAspect="1" noChangeArrowheads="1"/>
+          </p:cNvPicPr>
+          <p:nvPr/>
+        </p:nvPicPr>
+        <p:blipFill>
+          <a:blip r:embed="rId3">
+            <a:extLst>
+              <a:ext uri="{28A0092B-C50C-407E-A947-70E740481C1C}">
+                <a14:useLocalDpi xmlns:a14="http://schemas.microsoft.com/office/drawing/2010/main" val="0"/>
+              </a:ext>
+            </a:extLst>
+          </a:blip>
+          <a:srcRect/>
+          <a:stretch>
+            <a:fillRect/>
+          </a:stretch>
+        </p:blipFill>
+        <p:spPr bwMode="auto">
+          <a:xfrm>
+            <a:off x="4679402" y="2025328"/>
+            <a:ext cx="4235998" cy="3994472"/>
+          </a:xfrm>
+          <a:prstGeom prst="rect">
+            <a:avLst/>
+          </a:prstGeom>
+          <a:noFill/>
+          <a:ln>
+            <a:noFill/>
+          </a:ln>
+          <a:extLst>
+            <a:ext uri="{909E8E84-426E-40DD-AFC4-6F175D3DCCD1}">
+              <a14:hiddenFill xmlns:a14="http://schemas.microsoft.com/office/drawing/2010/main">
+                <a:solidFill>
+                  <a:schemeClr val="accent1"/>
+                </a:solidFill>
+              </a14:hiddenFill>
+            </a:ext>
+            <a:ext uri="{91240B29-F687-4F45-9708-019B960494DF}">
+              <a14:hiddenLine xmlns:a14="http://schemas.microsoft.com/office/drawing/2010/main" w="9525">
+                <a:solidFill>
+                  <a:schemeClr val="tx1"/>
+                </a:solidFill>
+                <a:miter lim="800000"/>
+                <a:headEnd/>
+                <a:tailEnd/>
+              </a14:hiddenLine>
+            </a:ext>
+          </a:extLst>
+        </p:spPr>
+      </p:pic>
     </p:spTree>
     <p:extLst>
       <p:ext uri="{BB962C8B-B14F-4D97-AF65-F5344CB8AC3E}">
@@ -11392,6 +11851,60 @@
           </a:p>
         </p:txBody>
       </p:sp>
+      <p:pic>
+        <p:nvPicPr>
+          <p:cNvPr id="7" name="Picture 2"/>
+          <p:cNvPicPr>
+            <a:picLocks noChangeAspect="1" noChangeArrowheads="1"/>
+          </p:cNvPicPr>
+          <p:nvPr/>
+        </p:nvPicPr>
+        <p:blipFill>
+          <a:blip r:embed="rId3">
+            <a:extLst>
+              <a:ext uri="{28A0092B-C50C-407E-A947-70E740481C1C}">
+                <a14:useLocalDpi xmlns:a14="http://schemas.microsoft.com/office/drawing/2010/main" val="0"/>
+              </a:ext>
+            </a:extLst>
+          </a:blip>
+          <a:srcRect/>
+          <a:stretch>
+            <a:fillRect/>
+          </a:stretch>
+        </p:blipFill>
+        <p:spPr bwMode="auto">
+          <a:xfrm>
+            <a:off x="4679402" y="2025328"/>
+            <a:ext cx="4235998" cy="3994472"/>
+          </a:xfrm>
+          <a:prstGeom prst="rect">
+            <a:avLst/>
+          </a:prstGeom>
+          <a:noFill/>
+          <a:ln>
+            <a:noFill/>
+          </a:ln>
+          <a:extLst>
+            <a:ext uri="{909E8E84-426E-40DD-AFC4-6F175D3DCCD1}">
+              <a14:hiddenFill xmlns:a14="http://schemas.microsoft.com/office/drawing/2010/main">
+                <a:solidFill>
+                  <a:schemeClr val="accent1"/>
+                </a:solidFill>
+              </a14:hiddenFill>
+            </a:ext>
+            <a:ext uri="{91240B29-F687-4F45-9708-019B960494DF}">
+              <a14:hiddenLine xmlns:a14="http://schemas.microsoft.com/office/drawing/2010/main" w="9525">
+                <a:solidFill>
+                  <a:schemeClr val="tx1"/>
+                </a:solidFill>
+                <a:miter lim="800000"/>
+                <a:headEnd/>
+                <a:tailEnd/>
+              </a14:hiddenLine>
+            </a:ext>
+          </a:extLst>
+        </p:spPr>
+      </p:pic>
     </p:spTree>
     <p:extLst>
       <p:ext uri="{BB962C8B-B14F-4D97-AF65-F5344CB8AC3E}">

</xml_diff>

<commit_message>
added back end portion of the ppt
</commit_message>
<xml_diff>
--- a/TEAM PROJECT DELIVERABLES/TEAM5OARS.pptx
+++ b/TEAM PROJECT DELIVERABLES/TEAM5OARS.pptx
@@ -9168,6 +9168,17 @@
           <a:bodyPr/>
           <a:lstStyle/>
           <a:p>
+            <a:endParaRPr lang="en-US" dirty="0"/>
+          </a:p>
+          <a:p>
+            <a:r>
+              <a:rPr lang="en-US" dirty="0"/>
+              <a:t>We are using MySQL Server to manage </a:t>
+            </a:r>
+            <a:r>
+              <a:rPr lang="en-US"/>
+              <a:t>the database</a:t>
+            </a:r>
             <a:endParaRPr lang="en-US" dirty="0"/>
           </a:p>
         </p:txBody>

</xml_diff>